<commit_message>
update factor graph lesson
</commit_message>
<xml_diff>
--- a/lessons/notebooks/figures/ffg-bayesian-linear-regression.pptx
+++ b/lessons/notebooks/figures/ffg-bayesian-linear-regression.pptx
@@ -154,10 +154,9 @@
           </a:lstStyle>
           <a:p>
             <a:r>
-              <a:rPr lang="en-US" smtClean="0"/>
+              <a:rPr lang="en-US"/>
               <a:t>Click to edit Master title style</a:t>
             </a:r>
-            <a:endParaRPr lang="en-US"/>
           </a:p>
         </p:txBody>
       </p:sp>
@@ -219,10 +218,9 @@
           </a:lstStyle>
           <a:p>
             <a:r>
-              <a:rPr lang="en-US" smtClean="0"/>
+              <a:rPr lang="en-US"/>
               <a:t>Click to edit Master subtitle style</a:t>
             </a:r>
-            <a:endParaRPr lang="en-US"/>
           </a:p>
         </p:txBody>
       </p:sp>
@@ -243,7 +241,7 @@
           <a:p>
             <a:fld id="{7DE29A69-406D-DD45-9AA5-47300041E804}" type="datetimeFigureOut">
               <a:rPr lang="en-US" smtClean="0"/>
-              <a:t>2/20/17</a:t>
+              <a:t>1/1/20</a:t>
             </a:fld>
             <a:endParaRPr lang="en-US"/>
           </a:p>
@@ -337,10 +335,9 @@
           <a:lstStyle/>
           <a:p>
             <a:r>
-              <a:rPr lang="en-US" smtClean="0"/>
+              <a:rPr lang="en-US"/>
               <a:t>Click to edit Master title style</a:t>
             </a:r>
-            <a:endParaRPr lang="en-US"/>
           </a:p>
         </p:txBody>
       </p:sp>
@@ -361,38 +358,37 @@
           <a:p>
             <a:pPr lvl="0"/>
             <a:r>
-              <a:rPr lang="en-US" smtClean="0"/>
+              <a:rPr lang="en-US"/>
               <a:t>Click to edit Master text styles</a:t>
             </a:r>
           </a:p>
           <a:p>
             <a:pPr lvl="1"/>
             <a:r>
-              <a:rPr lang="en-US" smtClean="0"/>
+              <a:rPr lang="en-US"/>
               <a:t>Second level</a:t>
             </a:r>
           </a:p>
           <a:p>
             <a:pPr lvl="2"/>
             <a:r>
-              <a:rPr lang="en-US" smtClean="0"/>
+              <a:rPr lang="en-US"/>
               <a:t>Third level</a:t>
             </a:r>
           </a:p>
           <a:p>
             <a:pPr lvl="3"/>
             <a:r>
-              <a:rPr lang="en-US" smtClean="0"/>
+              <a:rPr lang="en-US"/>
               <a:t>Fourth level</a:t>
             </a:r>
           </a:p>
           <a:p>
             <a:pPr lvl="4"/>
             <a:r>
-              <a:rPr lang="en-US" smtClean="0"/>
+              <a:rPr lang="en-US"/>
               <a:t>Fifth level</a:t>
             </a:r>
-            <a:endParaRPr lang="en-US"/>
           </a:p>
         </p:txBody>
       </p:sp>
@@ -413,7 +409,7 @@
           <a:p>
             <a:fld id="{7DE29A69-406D-DD45-9AA5-47300041E804}" type="datetimeFigureOut">
               <a:rPr lang="en-US" smtClean="0"/>
-              <a:t>2/20/17</a:t>
+              <a:t>1/1/20</a:t>
             </a:fld>
             <a:endParaRPr lang="en-US"/>
           </a:p>
@@ -512,10 +508,9 @@
           <a:lstStyle/>
           <a:p>
             <a:r>
-              <a:rPr lang="en-US" smtClean="0"/>
+              <a:rPr lang="en-US"/>
               <a:t>Click to edit Master title style</a:t>
             </a:r>
-            <a:endParaRPr lang="en-US"/>
           </a:p>
         </p:txBody>
       </p:sp>
@@ -541,38 +536,37 @@
           <a:p>
             <a:pPr lvl="0"/>
             <a:r>
-              <a:rPr lang="en-US" smtClean="0"/>
+              <a:rPr lang="en-US"/>
               <a:t>Click to edit Master text styles</a:t>
             </a:r>
           </a:p>
           <a:p>
             <a:pPr lvl="1"/>
             <a:r>
-              <a:rPr lang="en-US" smtClean="0"/>
+              <a:rPr lang="en-US"/>
               <a:t>Second level</a:t>
             </a:r>
           </a:p>
           <a:p>
             <a:pPr lvl="2"/>
             <a:r>
-              <a:rPr lang="en-US" smtClean="0"/>
+              <a:rPr lang="en-US"/>
               <a:t>Third level</a:t>
             </a:r>
           </a:p>
           <a:p>
             <a:pPr lvl="3"/>
             <a:r>
-              <a:rPr lang="en-US" smtClean="0"/>
+              <a:rPr lang="en-US"/>
               <a:t>Fourth level</a:t>
             </a:r>
           </a:p>
           <a:p>
             <a:pPr lvl="4"/>
             <a:r>
-              <a:rPr lang="en-US" smtClean="0"/>
+              <a:rPr lang="en-US"/>
               <a:t>Fifth level</a:t>
             </a:r>
-            <a:endParaRPr lang="en-US"/>
           </a:p>
         </p:txBody>
       </p:sp>
@@ -593,7 +587,7 @@
           <a:p>
             <a:fld id="{7DE29A69-406D-DD45-9AA5-47300041E804}" type="datetimeFigureOut">
               <a:rPr lang="en-US" smtClean="0"/>
-              <a:t>2/20/17</a:t>
+              <a:t>1/1/20</a:t>
             </a:fld>
             <a:endParaRPr lang="en-US"/>
           </a:p>
@@ -687,10 +681,9 @@
           <a:lstStyle/>
           <a:p>
             <a:r>
-              <a:rPr lang="en-US" smtClean="0"/>
+              <a:rPr lang="en-US"/>
               <a:t>Click to edit Master title style</a:t>
             </a:r>
-            <a:endParaRPr lang="en-US"/>
           </a:p>
         </p:txBody>
       </p:sp>
@@ -711,38 +704,37 @@
           <a:p>
             <a:pPr lvl="0"/>
             <a:r>
-              <a:rPr lang="en-US" smtClean="0"/>
+              <a:rPr lang="en-US"/>
               <a:t>Click to edit Master text styles</a:t>
             </a:r>
           </a:p>
           <a:p>
             <a:pPr lvl="1"/>
             <a:r>
-              <a:rPr lang="en-US" smtClean="0"/>
+              <a:rPr lang="en-US"/>
               <a:t>Second level</a:t>
             </a:r>
           </a:p>
           <a:p>
             <a:pPr lvl="2"/>
             <a:r>
-              <a:rPr lang="en-US" smtClean="0"/>
+              <a:rPr lang="en-US"/>
               <a:t>Third level</a:t>
             </a:r>
           </a:p>
           <a:p>
             <a:pPr lvl="3"/>
             <a:r>
-              <a:rPr lang="en-US" smtClean="0"/>
+              <a:rPr lang="en-US"/>
               <a:t>Fourth level</a:t>
             </a:r>
           </a:p>
           <a:p>
             <a:pPr lvl="4"/>
             <a:r>
-              <a:rPr lang="en-US" smtClean="0"/>
+              <a:rPr lang="en-US"/>
               <a:t>Fifth level</a:t>
             </a:r>
-            <a:endParaRPr lang="en-US"/>
           </a:p>
         </p:txBody>
       </p:sp>
@@ -763,7 +755,7 @@
           <a:p>
             <a:fld id="{7DE29A69-406D-DD45-9AA5-47300041E804}" type="datetimeFigureOut">
               <a:rPr lang="en-US" smtClean="0"/>
-              <a:t>2/20/17</a:t>
+              <a:t>1/1/20</a:t>
             </a:fld>
             <a:endParaRPr lang="en-US"/>
           </a:p>
@@ -866,10 +858,9 @@
           </a:lstStyle>
           <a:p>
             <a:r>
-              <a:rPr lang="en-US" smtClean="0"/>
+              <a:rPr lang="en-US"/>
               <a:t>Click to edit Master title style</a:t>
             </a:r>
-            <a:endParaRPr lang="en-US"/>
           </a:p>
         </p:txBody>
       </p:sp>
@@ -986,7 +977,7 @@
           <a:p>
             <a:pPr lvl="0"/>
             <a:r>
-              <a:rPr lang="en-US" smtClean="0"/>
+              <a:rPr lang="en-US"/>
               <a:t>Click to edit Master text styles</a:t>
             </a:r>
           </a:p>
@@ -1009,7 +1000,7 @@
           <a:p>
             <a:fld id="{7DE29A69-406D-DD45-9AA5-47300041E804}" type="datetimeFigureOut">
               <a:rPr lang="en-US" smtClean="0"/>
-              <a:t>2/20/17</a:t>
+              <a:t>1/1/20</a:t>
             </a:fld>
             <a:endParaRPr lang="en-US"/>
           </a:p>
@@ -1103,10 +1094,9 @@
           <a:lstStyle/>
           <a:p>
             <a:r>
-              <a:rPr lang="en-US" smtClean="0"/>
+              <a:rPr lang="en-US"/>
               <a:t>Click to edit Master title style</a:t>
             </a:r>
-            <a:endParaRPr lang="en-US"/>
           </a:p>
         </p:txBody>
       </p:sp>
@@ -1132,38 +1122,37 @@
           <a:p>
             <a:pPr lvl="0"/>
             <a:r>
-              <a:rPr lang="en-US" smtClean="0"/>
+              <a:rPr lang="en-US"/>
               <a:t>Click to edit Master text styles</a:t>
             </a:r>
           </a:p>
           <a:p>
             <a:pPr lvl="1"/>
             <a:r>
-              <a:rPr lang="en-US" smtClean="0"/>
+              <a:rPr lang="en-US"/>
               <a:t>Second level</a:t>
             </a:r>
           </a:p>
           <a:p>
             <a:pPr lvl="2"/>
             <a:r>
-              <a:rPr lang="en-US" smtClean="0"/>
+              <a:rPr lang="en-US"/>
               <a:t>Third level</a:t>
             </a:r>
           </a:p>
           <a:p>
             <a:pPr lvl="3"/>
             <a:r>
-              <a:rPr lang="en-US" smtClean="0"/>
+              <a:rPr lang="en-US"/>
               <a:t>Fourth level</a:t>
             </a:r>
           </a:p>
           <a:p>
             <a:pPr lvl="4"/>
             <a:r>
-              <a:rPr lang="en-US" smtClean="0"/>
+              <a:rPr lang="en-US"/>
               <a:t>Fifth level</a:t>
             </a:r>
-            <a:endParaRPr lang="en-US"/>
           </a:p>
         </p:txBody>
       </p:sp>
@@ -1189,38 +1178,37 @@
           <a:p>
             <a:pPr lvl="0"/>
             <a:r>
-              <a:rPr lang="en-US" smtClean="0"/>
+              <a:rPr lang="en-US"/>
               <a:t>Click to edit Master text styles</a:t>
             </a:r>
           </a:p>
           <a:p>
             <a:pPr lvl="1"/>
             <a:r>
-              <a:rPr lang="en-US" smtClean="0"/>
+              <a:rPr lang="en-US"/>
               <a:t>Second level</a:t>
             </a:r>
           </a:p>
           <a:p>
             <a:pPr lvl="2"/>
             <a:r>
-              <a:rPr lang="en-US" smtClean="0"/>
+              <a:rPr lang="en-US"/>
               <a:t>Third level</a:t>
             </a:r>
           </a:p>
           <a:p>
             <a:pPr lvl="3"/>
             <a:r>
-              <a:rPr lang="en-US" smtClean="0"/>
+              <a:rPr lang="en-US"/>
               <a:t>Fourth level</a:t>
             </a:r>
           </a:p>
           <a:p>
             <a:pPr lvl="4"/>
             <a:r>
-              <a:rPr lang="en-US" smtClean="0"/>
+              <a:rPr lang="en-US"/>
               <a:t>Fifth level</a:t>
             </a:r>
-            <a:endParaRPr lang="en-US"/>
           </a:p>
         </p:txBody>
       </p:sp>
@@ -1241,7 +1229,7 @@
           <a:p>
             <a:fld id="{7DE29A69-406D-DD45-9AA5-47300041E804}" type="datetimeFigureOut">
               <a:rPr lang="en-US" smtClean="0"/>
-              <a:t>2/20/17</a:t>
+              <a:t>1/1/20</a:t>
             </a:fld>
             <a:endParaRPr lang="en-US"/>
           </a:p>
@@ -1340,10 +1328,9 @@
           <a:lstStyle/>
           <a:p>
             <a:r>
-              <a:rPr lang="en-US" smtClean="0"/>
+              <a:rPr lang="en-US"/>
               <a:t>Click to edit Master title style</a:t>
             </a:r>
-            <a:endParaRPr lang="en-US"/>
           </a:p>
         </p:txBody>
       </p:sp>
@@ -1406,7 +1393,7 @@
           <a:p>
             <a:pPr lvl="0"/>
             <a:r>
-              <a:rPr lang="en-US" smtClean="0"/>
+              <a:rPr lang="en-US"/>
               <a:t>Click to edit Master text styles</a:t>
             </a:r>
           </a:p>
@@ -1434,38 +1421,37 @@
           <a:p>
             <a:pPr lvl="0"/>
             <a:r>
-              <a:rPr lang="en-US" smtClean="0"/>
+              <a:rPr lang="en-US"/>
               <a:t>Click to edit Master text styles</a:t>
             </a:r>
           </a:p>
           <a:p>
             <a:pPr lvl="1"/>
             <a:r>
-              <a:rPr lang="en-US" smtClean="0"/>
+              <a:rPr lang="en-US"/>
               <a:t>Second level</a:t>
             </a:r>
           </a:p>
           <a:p>
             <a:pPr lvl="2"/>
             <a:r>
-              <a:rPr lang="en-US" smtClean="0"/>
+              <a:rPr lang="en-US"/>
               <a:t>Third level</a:t>
             </a:r>
           </a:p>
           <a:p>
             <a:pPr lvl="3"/>
             <a:r>
-              <a:rPr lang="en-US" smtClean="0"/>
+              <a:rPr lang="en-US"/>
               <a:t>Fourth level</a:t>
             </a:r>
           </a:p>
           <a:p>
             <a:pPr lvl="4"/>
             <a:r>
-              <a:rPr lang="en-US" smtClean="0"/>
+              <a:rPr lang="en-US"/>
               <a:t>Fifth level</a:t>
             </a:r>
-            <a:endParaRPr lang="en-US"/>
           </a:p>
         </p:txBody>
       </p:sp>
@@ -1528,7 +1514,7 @@
           <a:p>
             <a:pPr lvl="0"/>
             <a:r>
-              <a:rPr lang="en-US" smtClean="0"/>
+              <a:rPr lang="en-US"/>
               <a:t>Click to edit Master text styles</a:t>
             </a:r>
           </a:p>
@@ -1556,38 +1542,37 @@
           <a:p>
             <a:pPr lvl="0"/>
             <a:r>
-              <a:rPr lang="en-US" smtClean="0"/>
+              <a:rPr lang="en-US"/>
               <a:t>Click to edit Master text styles</a:t>
             </a:r>
           </a:p>
           <a:p>
             <a:pPr lvl="1"/>
             <a:r>
-              <a:rPr lang="en-US" smtClean="0"/>
+              <a:rPr lang="en-US"/>
               <a:t>Second level</a:t>
             </a:r>
           </a:p>
           <a:p>
             <a:pPr lvl="2"/>
             <a:r>
-              <a:rPr lang="en-US" smtClean="0"/>
+              <a:rPr lang="en-US"/>
               <a:t>Third level</a:t>
             </a:r>
           </a:p>
           <a:p>
             <a:pPr lvl="3"/>
             <a:r>
-              <a:rPr lang="en-US" smtClean="0"/>
+              <a:rPr lang="en-US"/>
               <a:t>Fourth level</a:t>
             </a:r>
           </a:p>
           <a:p>
             <a:pPr lvl="4"/>
             <a:r>
-              <a:rPr lang="en-US" smtClean="0"/>
+              <a:rPr lang="en-US"/>
               <a:t>Fifth level</a:t>
             </a:r>
-            <a:endParaRPr lang="en-US"/>
           </a:p>
         </p:txBody>
       </p:sp>
@@ -1608,7 +1593,7 @@
           <a:p>
             <a:fld id="{7DE29A69-406D-DD45-9AA5-47300041E804}" type="datetimeFigureOut">
               <a:rPr lang="en-US" smtClean="0"/>
-              <a:t>2/20/17</a:t>
+              <a:t>1/1/20</a:t>
             </a:fld>
             <a:endParaRPr lang="en-US"/>
           </a:p>
@@ -1702,10 +1687,9 @@
           <a:lstStyle/>
           <a:p>
             <a:r>
-              <a:rPr lang="en-US" smtClean="0"/>
+              <a:rPr lang="en-US"/>
               <a:t>Click to edit Master title style</a:t>
             </a:r>
-            <a:endParaRPr lang="en-US"/>
           </a:p>
         </p:txBody>
       </p:sp>
@@ -1726,7 +1710,7 @@
           <a:p>
             <a:fld id="{7DE29A69-406D-DD45-9AA5-47300041E804}" type="datetimeFigureOut">
               <a:rPr lang="en-US" smtClean="0"/>
-              <a:t>2/20/17</a:t>
+              <a:t>1/1/20</a:t>
             </a:fld>
             <a:endParaRPr lang="en-US"/>
           </a:p>
@@ -1821,7 +1805,7 @@
           <a:p>
             <a:fld id="{7DE29A69-406D-DD45-9AA5-47300041E804}" type="datetimeFigureOut">
               <a:rPr lang="en-US" smtClean="0"/>
-              <a:t>2/20/17</a:t>
+              <a:t>1/1/20</a:t>
             </a:fld>
             <a:endParaRPr lang="en-US"/>
           </a:p>
@@ -1924,10 +1908,9 @@
           </a:lstStyle>
           <a:p>
             <a:r>
-              <a:rPr lang="en-US" smtClean="0"/>
+              <a:rPr lang="en-US"/>
               <a:t>Click to edit Master title style</a:t>
             </a:r>
-            <a:endParaRPr lang="en-US"/>
           </a:p>
         </p:txBody>
       </p:sp>
@@ -1981,38 +1964,37 @@
           <a:p>
             <a:pPr lvl="0"/>
             <a:r>
-              <a:rPr lang="en-US" smtClean="0"/>
+              <a:rPr lang="en-US"/>
               <a:t>Click to edit Master text styles</a:t>
             </a:r>
           </a:p>
           <a:p>
             <a:pPr lvl="1"/>
             <a:r>
-              <a:rPr lang="en-US" smtClean="0"/>
+              <a:rPr lang="en-US"/>
               <a:t>Second level</a:t>
             </a:r>
           </a:p>
           <a:p>
             <a:pPr lvl="2"/>
             <a:r>
-              <a:rPr lang="en-US" smtClean="0"/>
+              <a:rPr lang="en-US"/>
               <a:t>Third level</a:t>
             </a:r>
           </a:p>
           <a:p>
             <a:pPr lvl="3"/>
             <a:r>
-              <a:rPr lang="en-US" smtClean="0"/>
+              <a:rPr lang="en-US"/>
               <a:t>Fourth level</a:t>
             </a:r>
           </a:p>
           <a:p>
             <a:pPr lvl="4"/>
             <a:r>
-              <a:rPr lang="en-US" smtClean="0"/>
+              <a:rPr lang="en-US"/>
               <a:t>Fifth level</a:t>
             </a:r>
-            <a:endParaRPr lang="en-US"/>
           </a:p>
         </p:txBody>
       </p:sp>
@@ -2075,7 +2057,7 @@
           <a:p>
             <a:pPr lvl="0"/>
             <a:r>
-              <a:rPr lang="en-US" smtClean="0"/>
+              <a:rPr lang="en-US"/>
               <a:t>Click to edit Master text styles</a:t>
             </a:r>
           </a:p>
@@ -2098,7 +2080,7 @@
           <a:p>
             <a:fld id="{7DE29A69-406D-DD45-9AA5-47300041E804}" type="datetimeFigureOut">
               <a:rPr lang="en-US" smtClean="0"/>
-              <a:t>2/20/17</a:t>
+              <a:t>1/1/20</a:t>
             </a:fld>
             <a:endParaRPr lang="en-US"/>
           </a:p>
@@ -2201,10 +2183,9 @@
           </a:lstStyle>
           <a:p>
             <a:r>
-              <a:rPr lang="en-US" smtClean="0"/>
+              <a:rPr lang="en-US"/>
               <a:t>Click to edit Master title style</a:t>
             </a:r>
-            <a:endParaRPr lang="en-US"/>
           </a:p>
         </p:txBody>
       </p:sp>
@@ -2328,7 +2309,7 @@
           <a:p>
             <a:pPr lvl="0"/>
             <a:r>
-              <a:rPr lang="en-US" smtClean="0"/>
+              <a:rPr lang="en-US"/>
               <a:t>Click to edit Master text styles</a:t>
             </a:r>
           </a:p>
@@ -2351,7 +2332,7 @@
           <a:p>
             <a:fld id="{7DE29A69-406D-DD45-9AA5-47300041E804}" type="datetimeFigureOut">
               <a:rPr lang="en-US" smtClean="0"/>
-              <a:t>2/20/17</a:t>
+              <a:t>1/1/20</a:t>
             </a:fld>
             <a:endParaRPr lang="en-US"/>
           </a:p>
@@ -2460,10 +2441,9 @@
           <a:lstStyle/>
           <a:p>
             <a:r>
-              <a:rPr lang="en-US" smtClean="0"/>
+              <a:rPr lang="en-US"/>
               <a:t>Click to edit Master title style</a:t>
             </a:r>
-            <a:endParaRPr lang="en-US"/>
           </a:p>
         </p:txBody>
       </p:sp>
@@ -2494,38 +2474,37 @@
           <a:p>
             <a:pPr lvl="0"/>
             <a:r>
-              <a:rPr lang="en-US" smtClean="0"/>
+              <a:rPr lang="en-US"/>
               <a:t>Click to edit Master text styles</a:t>
             </a:r>
           </a:p>
           <a:p>
             <a:pPr lvl="1"/>
             <a:r>
-              <a:rPr lang="en-US" smtClean="0"/>
+              <a:rPr lang="en-US"/>
               <a:t>Second level</a:t>
             </a:r>
           </a:p>
           <a:p>
             <a:pPr lvl="2"/>
             <a:r>
-              <a:rPr lang="en-US" smtClean="0"/>
+              <a:rPr lang="en-US"/>
               <a:t>Third level</a:t>
             </a:r>
           </a:p>
           <a:p>
             <a:pPr lvl="3"/>
             <a:r>
-              <a:rPr lang="en-US" smtClean="0"/>
+              <a:rPr lang="en-US"/>
               <a:t>Fourth level</a:t>
             </a:r>
           </a:p>
           <a:p>
             <a:pPr lvl="4"/>
             <a:r>
-              <a:rPr lang="en-US" smtClean="0"/>
+              <a:rPr lang="en-US"/>
               <a:t>Fifth level</a:t>
             </a:r>
-            <a:endParaRPr lang="en-US"/>
           </a:p>
         </p:txBody>
       </p:sp>
@@ -2564,7 +2543,7 @@
           <a:p>
             <a:fld id="{7DE29A69-406D-DD45-9AA5-47300041E804}" type="datetimeFigureOut">
               <a:rPr lang="en-US" smtClean="0"/>
-              <a:t>2/20/17</a:t>
+              <a:t>1/1/20</a:t>
             </a:fld>
             <a:endParaRPr lang="en-US"/>
           </a:p>
@@ -2971,16 +2950,22 @@
       </p:grpSpPr>
       <p:grpSp>
         <p:nvGrpSpPr>
-          <p:cNvPr id="69" name="Group 68"/>
+          <p:cNvPr id="102" name="Group 101">
+            <a:extLst>
+              <a:ext uri="{FF2B5EF4-FFF2-40B4-BE49-F238E27FC236}">
+                <a16:creationId xmlns:a16="http://schemas.microsoft.com/office/drawing/2014/main" id="{9854A2AB-B4CF-9C47-B2A2-4682576F6F3A}"/>
+              </a:ext>
+            </a:extLst>
+          </p:cNvPr>
           <p:cNvGrpSpPr/>
           <p:nvPr/>
         </p:nvGrpSpPr>
         <p:grpSpPr>
           <a:xfrm>
-            <a:off x="1161352" y="962144"/>
-            <a:ext cx="3007864" cy="3618985"/>
-            <a:chOff x="1161352" y="962144"/>
-            <a:chExt cx="3007864" cy="3618985"/>
+            <a:off x="1394198" y="962144"/>
+            <a:ext cx="6108360" cy="3618985"/>
+            <a:chOff x="1394198" y="962144"/>
+            <a:chExt cx="6108360" cy="3618985"/>
           </a:xfrm>
         </p:grpSpPr>
         <p:sp>
@@ -3054,6 +3039,7 @@
                 </a:bodyPr>
                 <a:lstStyle/>
                 <a:p>
+                  <a:pPr/>
                   <a14:m>
                     <m:oMathPara xmlns:m="http://schemas.openxmlformats.org/officeDocument/2006/math">
                       <m:oMathParaPr>
@@ -3109,10 +3095,10 @@
                 <a:prstGeom prst="rect">
                   <a:avLst/>
                 </a:prstGeom>
-                <a:blipFill rotWithShape="0">
+                <a:blipFill>
                   <a:blip r:embed="rId2"/>
                   <a:stretch>
-                    <a:fillRect b="-13115"/>
+                    <a:fillRect b="-13333"/>
                   </a:stretch>
                 </a:blipFill>
               </p:spPr>
@@ -3205,10 +3191,9 @@
             <a:lstStyle/>
             <a:p>
               <a:r>
-                <a:rPr lang="en-US" sz="2400" dirty="0" smtClean="0"/>
+                <a:rPr lang="en-US" sz="2400" dirty="0"/>
                 <a:t>=</a:t>
               </a:r>
-              <a:endParaRPr lang="en-US" sz="2400" dirty="0"/>
             </a:p>
           </p:txBody>
         </p:sp>
@@ -3353,6 +3338,7 @@
                 </a:bodyPr>
                 <a:lstStyle/>
                 <a:p>
+                  <a:pPr/>
                   <a14:m>
                     <m:oMathPara xmlns:m="http://schemas.openxmlformats.org/officeDocument/2006/math">
                       <m:oMathParaPr>
@@ -3390,7 +3376,7 @@
                 <a:prstGeom prst="rect">
                   <a:avLst/>
                 </a:prstGeom>
-                <a:blipFill rotWithShape="0">
+                <a:blipFill>
                   <a:blip r:embed="rId3"/>
                   <a:stretch>
                     <a:fillRect/>
@@ -3412,59 +3398,11 @@
             </p:sp>
           </mc:Fallback>
         </mc:AlternateContent>
-        <p:sp>
-          <p:nvSpPr>
-            <p:cNvPr id="15" name="Rectangle 14"/>
-            <p:cNvSpPr/>
-            <p:nvPr/>
-          </p:nvSpPr>
-          <p:spPr>
-            <a:xfrm>
-              <a:off x="2190746" y="2533128"/>
-              <a:ext cx="232846" cy="207567"/>
-            </a:xfrm>
-            <a:prstGeom prst="rect">
-              <a:avLst/>
-            </a:prstGeom>
-            <a:solidFill>
-              <a:schemeClr val="tx1"/>
-            </a:solidFill>
-            <a:ln w="28575">
-              <a:solidFill>
-                <a:schemeClr val="tx1"/>
-              </a:solidFill>
-            </a:ln>
-          </p:spPr>
-          <p:style>
-            <a:lnRef idx="2">
-              <a:schemeClr val="accent1">
-                <a:shade val="50000"/>
-              </a:schemeClr>
-            </a:lnRef>
-            <a:fillRef idx="1">
-              <a:schemeClr val="accent1"/>
-            </a:fillRef>
-            <a:effectRef idx="0">
-              <a:schemeClr val="accent1"/>
-            </a:effectRef>
-            <a:fontRef idx="minor">
-              <a:schemeClr val="lt1"/>
-            </a:fontRef>
-          </p:style>
-          <p:txBody>
-            <a:bodyPr rtlCol="0" anchor="ctr"/>
-            <a:lstStyle/>
-            <a:p>
-              <a:pPr algn="ctr"/>
-              <a:endParaRPr lang="en-US" dirty="0"/>
-            </a:p>
-          </p:txBody>
-        </p:sp>
         <p:cxnSp>
           <p:nvCxnSpPr>
             <p:cNvPr id="17" name="Straight Connector 16"/>
             <p:cNvCxnSpPr>
-              <a:stCxn id="15" idx="3"/>
+              <a:cxnSpLocks/>
               <a:endCxn id="13" idx="1"/>
             </p:cNvCxnSpPr>
             <p:nvPr/>
@@ -3651,54 +3589,6 @@
             </a:fontRef>
           </p:style>
         </p:cxnSp>
-        <p:sp>
-          <p:nvSpPr>
-            <p:cNvPr id="23" name="Rectangle 22"/>
-            <p:cNvSpPr/>
-            <p:nvPr/>
-          </p:nvSpPr>
-          <p:spPr>
-            <a:xfrm>
-              <a:off x="3120539" y="4373562"/>
-              <a:ext cx="232846" cy="207567"/>
-            </a:xfrm>
-            <a:prstGeom prst="rect">
-              <a:avLst/>
-            </a:prstGeom>
-            <a:solidFill>
-              <a:schemeClr val="tx1"/>
-            </a:solidFill>
-            <a:ln w="28575">
-              <a:solidFill>
-                <a:schemeClr val="tx1"/>
-              </a:solidFill>
-            </a:ln>
-          </p:spPr>
-          <p:style>
-            <a:lnRef idx="2">
-              <a:schemeClr val="accent1">
-                <a:shade val="50000"/>
-              </a:schemeClr>
-            </a:lnRef>
-            <a:fillRef idx="1">
-              <a:schemeClr val="accent1"/>
-            </a:fillRef>
-            <a:effectRef idx="0">
-              <a:schemeClr val="accent1"/>
-            </a:effectRef>
-            <a:fontRef idx="minor">
-              <a:schemeClr val="lt1"/>
-            </a:fontRef>
-          </p:style>
-          <p:txBody>
-            <a:bodyPr rtlCol="0" anchor="ctr"/>
-            <a:lstStyle/>
-            <a:p>
-              <a:pPr algn="ctr"/>
-              <a:endParaRPr lang="en-US" dirty="0"/>
-            </a:p>
-          </p:txBody>
-        </p:sp>
         <p:sp>
           <p:nvSpPr>
             <p:cNvPr id="25" name="Oval 24"/>
@@ -3770,6 +3660,7 @@
                 </a:bodyPr>
                 <a:lstStyle/>
                 <a:p>
+                  <a:pPr/>
                   <a14:m>
                     <m:oMathPara xmlns:m="http://schemas.openxmlformats.org/officeDocument/2006/math">
                       <m:oMathParaPr>
@@ -3807,7 +3698,7 @@
                 <a:prstGeom prst="rect">
                   <a:avLst/>
                 </a:prstGeom>
-                <a:blipFill rotWithShape="0">
+                <a:blipFill>
                   <a:blip r:embed="rId4"/>
                   <a:stretch>
                     <a:fillRect/>
@@ -3867,54 +3758,6 @@
             </a:fontRef>
           </p:style>
         </p:cxnSp>
-        <p:sp>
-          <p:nvSpPr>
-            <p:cNvPr id="30" name="Rectangle 29"/>
-            <p:cNvSpPr/>
-            <p:nvPr/>
-          </p:nvSpPr>
-          <p:spPr>
-            <a:xfrm>
-              <a:off x="1161352" y="3509465"/>
-              <a:ext cx="232846" cy="207567"/>
-            </a:xfrm>
-            <a:prstGeom prst="rect">
-              <a:avLst/>
-            </a:prstGeom>
-            <a:solidFill>
-              <a:schemeClr val="tx1"/>
-            </a:solidFill>
-            <a:ln w="28575">
-              <a:solidFill>
-                <a:schemeClr val="tx1"/>
-              </a:solidFill>
-            </a:ln>
-          </p:spPr>
-          <p:style>
-            <a:lnRef idx="2">
-              <a:schemeClr val="accent1">
-                <a:shade val="50000"/>
-              </a:schemeClr>
-            </a:lnRef>
-            <a:fillRef idx="1">
-              <a:schemeClr val="accent1"/>
-            </a:fillRef>
-            <a:effectRef idx="0">
-              <a:schemeClr val="accent1"/>
-            </a:effectRef>
-            <a:fontRef idx="minor">
-              <a:schemeClr val="lt1"/>
-            </a:fontRef>
-          </p:style>
-          <p:txBody>
-            <a:bodyPr rtlCol="0" anchor="ctr"/>
-            <a:lstStyle/>
-            <a:p>
-              <a:pPr algn="ctr"/>
-              <a:endParaRPr lang="en-US" dirty="0"/>
-            </a:p>
-          </p:txBody>
-        </p:sp>
         <mc:AlternateContent xmlns:mc="http://schemas.openxmlformats.org/markup-compatibility/2006">
           <mc:Choice xmlns:a14="http://schemas.microsoft.com/office/drawing/2010/main" Requires="a14">
             <p:sp>
@@ -3941,6 +3784,7 @@
                 </a:bodyPr>
                 <a:lstStyle/>
                 <a:p>
+                  <a:pPr/>
                   <a14:m>
                     <m:oMathPara xmlns:m="http://schemas.openxmlformats.org/officeDocument/2006/math">
                       <m:oMathParaPr>
@@ -3978,7 +3822,7 @@
                 <a:prstGeom prst="rect">
                   <a:avLst/>
                 </a:prstGeom>
-                <a:blipFill rotWithShape="0">
+                <a:blipFill>
                   <a:blip r:embed="rId5"/>
                   <a:stretch>
                     <a:fillRect b="-6667"/>
@@ -4029,6 +3873,7 @@
                 </a:bodyPr>
                 <a:lstStyle/>
                 <a:p>
+                  <a:pPr/>
                   <a14:m>
                     <m:oMathPara xmlns:m="http://schemas.openxmlformats.org/officeDocument/2006/math">
                       <m:oMathParaPr>
@@ -4039,7 +3884,7 @@
                           <m:sSupPr>
                             <m:ctrlPr>
                               <a:rPr lang="en-US" b="0" i="1" smtClean="0">
-                                <a:latin typeface="Cambria Math" charset="0"/>
+                                <a:latin typeface="Cambria Math" panose="02040503050406030204" pitchFamily="18" charset="0"/>
                               </a:rPr>
                             </m:ctrlPr>
                           </m:sSupPr>
@@ -4087,7 +3932,7 @@
                 <a:prstGeom prst="rect">
                   <a:avLst/>
                 </a:prstGeom>
-                <a:blipFill rotWithShape="0">
+                <a:blipFill>
                   <a:blip r:embed="rId6"/>
                   <a:stretch>
                     <a:fillRect/>
@@ -4112,524 +3957,6 @@
             </p:sp>
           </mc:Fallback>
         </mc:AlternateContent>
-        <p:cxnSp>
-          <p:nvCxnSpPr>
-            <p:cNvPr id="35" name="Straight Arrow Connector 34"/>
-            <p:cNvCxnSpPr/>
-            <p:nvPr/>
-          </p:nvCxnSpPr>
-          <p:spPr>
-            <a:xfrm>
-              <a:off x="2552886" y="1331476"/>
-              <a:ext cx="504056" cy="0"/>
-            </a:xfrm>
-            <a:prstGeom prst="straightConnector1">
-              <a:avLst/>
-            </a:prstGeom>
-            <a:ln w="28575">
-              <a:solidFill>
-                <a:srgbClr val="FF0000"/>
-              </a:solidFill>
-              <a:tailEnd type="arrow"/>
-            </a:ln>
-          </p:spPr>
-          <p:style>
-            <a:lnRef idx="1">
-              <a:schemeClr val="accent1"/>
-            </a:lnRef>
-            <a:fillRef idx="0">
-              <a:schemeClr val="accent1"/>
-            </a:fillRef>
-            <a:effectRef idx="0">
-              <a:schemeClr val="accent1"/>
-            </a:effectRef>
-            <a:fontRef idx="minor">
-              <a:schemeClr val="tx1"/>
-            </a:fontRef>
-          </p:style>
-        </p:cxnSp>
-        <p:cxnSp>
-          <p:nvCxnSpPr>
-            <p:cNvPr id="36" name="Straight Arrow Connector 35"/>
-            <p:cNvCxnSpPr/>
-            <p:nvPr/>
-          </p:nvCxnSpPr>
-          <p:spPr>
-            <a:xfrm>
-              <a:off x="2430674" y="2405573"/>
-              <a:ext cx="504056" cy="0"/>
-            </a:xfrm>
-            <a:prstGeom prst="straightConnector1">
-              <a:avLst/>
-            </a:prstGeom>
-            <a:ln w="28575">
-              <a:solidFill>
-                <a:srgbClr val="FF0000"/>
-              </a:solidFill>
-              <a:tailEnd type="arrow"/>
-            </a:ln>
-          </p:spPr>
-          <p:style>
-            <a:lnRef idx="1">
-              <a:schemeClr val="accent1"/>
-            </a:lnRef>
-            <a:fillRef idx="0">
-              <a:schemeClr val="accent1"/>
-            </a:fillRef>
-            <a:effectRef idx="0">
-              <a:schemeClr val="accent1"/>
-            </a:effectRef>
-            <a:fontRef idx="minor">
-              <a:schemeClr val="tx1"/>
-            </a:fontRef>
-          </p:style>
-        </p:cxnSp>
-        <p:cxnSp>
-          <p:nvCxnSpPr>
-            <p:cNvPr id="38" name="Straight Arrow Connector 37"/>
-            <p:cNvCxnSpPr/>
-            <p:nvPr/>
-          </p:nvCxnSpPr>
-          <p:spPr>
-            <a:xfrm>
-              <a:off x="2576146" y="3397225"/>
-              <a:ext cx="384744" cy="0"/>
-            </a:xfrm>
-            <a:prstGeom prst="straightConnector1">
-              <a:avLst/>
-            </a:prstGeom>
-            <a:ln w="28575">
-              <a:solidFill>
-                <a:srgbClr val="FF0000"/>
-              </a:solidFill>
-              <a:tailEnd type="arrow"/>
-            </a:ln>
-          </p:spPr>
-          <p:style>
-            <a:lnRef idx="1">
-              <a:schemeClr val="accent1"/>
-            </a:lnRef>
-            <a:fillRef idx="0">
-              <a:schemeClr val="accent1"/>
-            </a:fillRef>
-            <a:effectRef idx="0">
-              <a:schemeClr val="accent1"/>
-            </a:effectRef>
-            <a:fontRef idx="minor">
-              <a:schemeClr val="tx1"/>
-            </a:fontRef>
-          </p:style>
-        </p:cxnSp>
-        <p:cxnSp>
-          <p:nvCxnSpPr>
-            <p:cNvPr id="39" name="Straight Arrow Connector 38"/>
-            <p:cNvCxnSpPr/>
-            <p:nvPr/>
-          </p:nvCxnSpPr>
-          <p:spPr>
-            <a:xfrm>
-              <a:off x="3481629" y="1447510"/>
-              <a:ext cx="504056" cy="0"/>
-            </a:xfrm>
-            <a:prstGeom prst="straightConnector1">
-              <a:avLst/>
-            </a:prstGeom>
-            <a:ln w="28575">
-              <a:solidFill>
-                <a:srgbClr val="FF0000"/>
-              </a:solidFill>
-              <a:tailEnd type="arrow"/>
-            </a:ln>
-          </p:spPr>
-          <p:style>
-            <a:lnRef idx="1">
-              <a:schemeClr val="accent1"/>
-            </a:lnRef>
-            <a:fillRef idx="0">
-              <a:schemeClr val="accent1"/>
-            </a:fillRef>
-            <a:effectRef idx="0">
-              <a:schemeClr val="accent1"/>
-            </a:effectRef>
-            <a:fontRef idx="minor">
-              <a:schemeClr val="tx1"/>
-            </a:fontRef>
-          </p:style>
-        </p:cxnSp>
-        <p:cxnSp>
-          <p:nvCxnSpPr>
-            <p:cNvPr id="40" name="Straight Arrow Connector 39"/>
-            <p:cNvCxnSpPr/>
-            <p:nvPr/>
-          </p:nvCxnSpPr>
-          <p:spPr>
-            <a:xfrm flipV="1">
-              <a:off x="3622765" y="3806792"/>
-              <a:ext cx="0" cy="384386"/>
-            </a:xfrm>
-            <a:prstGeom prst="straightConnector1">
-              <a:avLst/>
-            </a:prstGeom>
-            <a:ln w="28575">
-              <a:solidFill>
-                <a:srgbClr val="FF0000"/>
-              </a:solidFill>
-              <a:tailEnd type="arrow"/>
-            </a:ln>
-          </p:spPr>
-          <p:style>
-            <a:lnRef idx="1">
-              <a:schemeClr val="accent1"/>
-            </a:lnRef>
-            <a:fillRef idx="0">
-              <a:schemeClr val="accent1"/>
-            </a:fillRef>
-            <a:effectRef idx="0">
-              <a:schemeClr val="accent1"/>
-            </a:effectRef>
-            <a:fontRef idx="minor">
-              <a:schemeClr val="tx1"/>
-            </a:fontRef>
-          </p:style>
-        </p:cxnSp>
-        <p:cxnSp>
-          <p:nvCxnSpPr>
-            <p:cNvPr id="43" name="Straight Arrow Connector 42"/>
-            <p:cNvCxnSpPr/>
-            <p:nvPr/>
-          </p:nvCxnSpPr>
-          <p:spPr>
-            <a:xfrm flipV="1">
-              <a:off x="3513035" y="2932887"/>
-              <a:ext cx="0" cy="384386"/>
-            </a:xfrm>
-            <a:prstGeom prst="straightConnector1">
-              <a:avLst/>
-            </a:prstGeom>
-            <a:ln w="28575">
-              <a:solidFill>
-                <a:srgbClr val="FF0000"/>
-              </a:solidFill>
-              <a:tailEnd type="arrow"/>
-            </a:ln>
-          </p:spPr>
-          <p:style>
-            <a:lnRef idx="1">
-              <a:schemeClr val="accent1"/>
-            </a:lnRef>
-            <a:fillRef idx="0">
-              <a:schemeClr val="accent1"/>
-            </a:fillRef>
-            <a:effectRef idx="0">
-              <a:schemeClr val="accent1"/>
-            </a:effectRef>
-            <a:fontRef idx="minor">
-              <a:schemeClr val="tx1"/>
-            </a:fontRef>
-          </p:style>
-        </p:cxnSp>
-        <p:cxnSp>
-          <p:nvCxnSpPr>
-            <p:cNvPr id="44" name="Straight Arrow Connector 43"/>
-            <p:cNvCxnSpPr/>
-            <p:nvPr/>
-          </p:nvCxnSpPr>
-          <p:spPr>
-            <a:xfrm flipV="1">
-              <a:off x="3482236" y="1931640"/>
-              <a:ext cx="0" cy="384386"/>
-            </a:xfrm>
-            <a:prstGeom prst="straightConnector1">
-              <a:avLst/>
-            </a:prstGeom>
-            <a:ln w="28575">
-              <a:solidFill>
-                <a:srgbClr val="FF0000"/>
-              </a:solidFill>
-              <a:tailEnd type="arrow"/>
-            </a:ln>
-          </p:spPr>
-          <p:style>
-            <a:lnRef idx="1">
-              <a:schemeClr val="accent1"/>
-            </a:lnRef>
-            <a:fillRef idx="0">
-              <a:schemeClr val="accent1"/>
-            </a:fillRef>
-            <a:effectRef idx="0">
-              <a:schemeClr val="accent1"/>
-            </a:effectRef>
-            <a:fontRef idx="minor">
-              <a:schemeClr val="tx1"/>
-            </a:fontRef>
-          </p:style>
-        </p:cxnSp>
-        <p:sp>
-          <p:nvSpPr>
-            <p:cNvPr id="45" name="TextBox 44"/>
-            <p:cNvSpPr txBox="1"/>
-            <p:nvPr/>
-          </p:nvSpPr>
-          <p:spPr>
-            <a:xfrm>
-              <a:off x="2622237" y="962144"/>
-              <a:ext cx="301686" cy="369332"/>
-            </a:xfrm>
-            <a:prstGeom prst="rect">
-              <a:avLst/>
-            </a:prstGeom>
-            <a:noFill/>
-          </p:spPr>
-          <p:txBody>
-            <a:bodyPr wrap="none" rtlCol="0">
-              <a:spAutoFit/>
-            </a:bodyPr>
-            <a:lstStyle/>
-            <a:p>
-              <a:r>
-                <a:rPr lang="en-US" dirty="0" smtClean="0">
-                  <a:solidFill>
-                    <a:srgbClr val="FF0000"/>
-                  </a:solidFill>
-                </a:rPr>
-                <a:t>1</a:t>
-              </a:r>
-              <a:endParaRPr lang="en-US" dirty="0">
-                <a:solidFill>
-                  <a:srgbClr val="FF0000"/>
-                </a:solidFill>
-              </a:endParaRPr>
-            </a:p>
-          </p:txBody>
-        </p:sp>
-        <p:sp>
-          <p:nvSpPr>
-            <p:cNvPr id="48" name="TextBox 47"/>
-            <p:cNvSpPr txBox="1"/>
-            <p:nvPr/>
-          </p:nvSpPr>
-          <p:spPr>
-            <a:xfrm>
-              <a:off x="3727221" y="3829273"/>
-              <a:ext cx="301686" cy="369332"/>
-            </a:xfrm>
-            <a:prstGeom prst="rect">
-              <a:avLst/>
-            </a:prstGeom>
-            <a:noFill/>
-          </p:spPr>
-          <p:txBody>
-            <a:bodyPr wrap="none" rtlCol="0">
-              <a:spAutoFit/>
-            </a:bodyPr>
-            <a:lstStyle/>
-            <a:p>
-              <a:r>
-                <a:rPr lang="en-US" dirty="0" smtClean="0">
-                  <a:solidFill>
-                    <a:srgbClr val="FF0000"/>
-                  </a:solidFill>
-                </a:rPr>
-                <a:t>2</a:t>
-              </a:r>
-              <a:endParaRPr lang="en-US" dirty="0">
-                <a:solidFill>
-                  <a:srgbClr val="FF0000"/>
-                </a:solidFill>
-              </a:endParaRPr>
-            </a:p>
-          </p:txBody>
-        </p:sp>
-        <p:sp>
-          <p:nvSpPr>
-            <p:cNvPr id="49" name="TextBox 48"/>
-            <p:cNvSpPr txBox="1"/>
-            <p:nvPr/>
-          </p:nvSpPr>
-          <p:spPr>
-            <a:xfrm>
-              <a:off x="1548073" y="3017079"/>
-              <a:ext cx="289595" cy="369332"/>
-            </a:xfrm>
-            <a:prstGeom prst="rect">
-              <a:avLst/>
-            </a:prstGeom>
-            <a:noFill/>
-          </p:spPr>
-          <p:txBody>
-            <a:bodyPr wrap="square" rtlCol="0">
-              <a:spAutoFit/>
-            </a:bodyPr>
-            <a:lstStyle/>
-            <a:p>
-              <a:r>
-                <a:rPr lang="en-US" dirty="0" smtClean="0">
-                  <a:solidFill>
-                    <a:srgbClr val="FF0000"/>
-                  </a:solidFill>
-                </a:rPr>
-                <a:t>3</a:t>
-              </a:r>
-              <a:endParaRPr lang="en-US" dirty="0">
-                <a:solidFill>
-                  <a:srgbClr val="FF0000"/>
-                </a:solidFill>
-              </a:endParaRPr>
-            </a:p>
-          </p:txBody>
-        </p:sp>
-        <p:sp>
-          <p:nvSpPr>
-            <p:cNvPr id="50" name="TextBox 49"/>
-            <p:cNvSpPr txBox="1"/>
-            <p:nvPr/>
-          </p:nvSpPr>
-          <p:spPr>
-            <a:xfrm>
-              <a:off x="2607338" y="3019961"/>
-              <a:ext cx="301686" cy="369332"/>
-            </a:xfrm>
-            <a:prstGeom prst="rect">
-              <a:avLst/>
-            </a:prstGeom>
-            <a:noFill/>
-          </p:spPr>
-          <p:txBody>
-            <a:bodyPr wrap="none" rtlCol="0">
-              <a:spAutoFit/>
-            </a:bodyPr>
-            <a:lstStyle/>
-            <a:p>
-              <a:r>
-                <a:rPr lang="en-US" dirty="0" smtClean="0">
-                  <a:solidFill>
-                    <a:srgbClr val="FF0000"/>
-                  </a:solidFill>
-                </a:rPr>
-                <a:t>4</a:t>
-              </a:r>
-              <a:endParaRPr lang="en-US" dirty="0">
-                <a:solidFill>
-                  <a:srgbClr val="FF0000"/>
-                </a:solidFill>
-              </a:endParaRPr>
-            </a:p>
-          </p:txBody>
-        </p:sp>
-        <p:sp>
-          <p:nvSpPr>
-            <p:cNvPr id="57" name="TextBox 56"/>
-            <p:cNvSpPr txBox="1"/>
-            <p:nvPr/>
-          </p:nvSpPr>
-          <p:spPr>
-            <a:xfrm>
-              <a:off x="3512428" y="2965314"/>
-              <a:ext cx="405305" cy="369332"/>
-            </a:xfrm>
-            <a:prstGeom prst="rect">
-              <a:avLst/>
-            </a:prstGeom>
-            <a:noFill/>
-          </p:spPr>
-          <p:txBody>
-            <a:bodyPr wrap="square" rtlCol="0">
-              <a:spAutoFit/>
-            </a:bodyPr>
-            <a:lstStyle/>
-            <a:p>
-              <a:r>
-                <a:rPr lang="en-US" smtClean="0">
-                  <a:solidFill>
-                    <a:srgbClr val="FF0000"/>
-                  </a:solidFill>
-                </a:rPr>
-                <a:t>5</a:t>
-              </a:r>
-              <a:endParaRPr lang="en-US" dirty="0">
-                <a:solidFill>
-                  <a:srgbClr val="FF0000"/>
-                </a:solidFill>
-              </a:endParaRPr>
-            </a:p>
-          </p:txBody>
-        </p:sp>
-        <p:sp>
-          <p:nvSpPr>
-            <p:cNvPr id="58" name="TextBox 57"/>
-            <p:cNvSpPr txBox="1"/>
-            <p:nvPr/>
-          </p:nvSpPr>
-          <p:spPr>
-            <a:xfrm>
-              <a:off x="2506368" y="2058316"/>
-              <a:ext cx="405305" cy="369332"/>
-            </a:xfrm>
-            <a:prstGeom prst="rect">
-              <a:avLst/>
-            </a:prstGeom>
-            <a:noFill/>
-          </p:spPr>
-          <p:txBody>
-            <a:bodyPr wrap="square" rtlCol="0">
-              <a:spAutoFit/>
-            </a:bodyPr>
-            <a:lstStyle/>
-            <a:p>
-              <a:r>
-                <a:rPr lang="en-US" smtClean="0">
-                  <a:solidFill>
-                    <a:srgbClr val="FF0000"/>
-                  </a:solidFill>
-                </a:rPr>
-                <a:t>6</a:t>
-              </a:r>
-              <a:endParaRPr lang="en-US" dirty="0">
-                <a:solidFill>
-                  <a:srgbClr val="FF0000"/>
-                </a:solidFill>
-              </a:endParaRPr>
-            </a:p>
-          </p:txBody>
-        </p:sp>
-        <p:sp>
-          <p:nvSpPr>
-            <p:cNvPr id="59" name="TextBox 58"/>
-            <p:cNvSpPr txBox="1"/>
-            <p:nvPr/>
-          </p:nvSpPr>
-          <p:spPr>
-            <a:xfrm>
-              <a:off x="3481629" y="1971254"/>
-              <a:ext cx="405305" cy="369332"/>
-            </a:xfrm>
-            <a:prstGeom prst="rect">
-              <a:avLst/>
-            </a:prstGeom>
-            <a:noFill/>
-          </p:spPr>
-          <p:txBody>
-            <a:bodyPr wrap="square" rtlCol="0">
-              <a:spAutoFit/>
-            </a:bodyPr>
-            <a:lstStyle/>
-            <a:p>
-              <a:r>
-                <a:rPr lang="en-US" dirty="0" smtClean="0">
-                  <a:solidFill>
-                    <a:srgbClr val="FF0000"/>
-                  </a:solidFill>
-                </a:rPr>
-                <a:t>7</a:t>
-              </a:r>
-              <a:endParaRPr lang="en-US" dirty="0">
-                <a:solidFill>
-                  <a:srgbClr val="FF0000"/>
-                </a:solidFill>
-              </a:endParaRPr>
-            </a:p>
-          </p:txBody>
-        </p:sp>
         <p:sp>
           <p:nvSpPr>
             <p:cNvPr id="61" name="Rectangle 60"/>
@@ -4739,6 +4066,7 @@
                 </a:bodyPr>
                 <a:lstStyle/>
                 <a:p>
+                  <a:pPr/>
                   <a14:m>
                     <m:oMathPara xmlns:m="http://schemas.openxmlformats.org/officeDocument/2006/math">
                       <m:oMathParaPr>
@@ -4778,7 +4106,7 @@
                 <a:prstGeom prst="rect">
                   <a:avLst/>
                 </a:prstGeom>
-                <a:blipFill rotWithShape="0">
+                <a:blipFill>
                   <a:blip r:embed="rId7"/>
                   <a:stretch>
                     <a:fillRect/>
@@ -4829,6 +4157,7 @@
                 </a:bodyPr>
                 <a:lstStyle/>
                 <a:p>
+                  <a:pPr/>
                   <a14:m>
                     <m:oMathPara xmlns:m="http://schemas.openxmlformats.org/officeDocument/2006/math">
                       <m:oMathParaPr>
@@ -4866,7 +4195,7 @@
                 <a:prstGeom prst="rect">
                   <a:avLst/>
                 </a:prstGeom>
-                <a:blipFill rotWithShape="0">
+                <a:blipFill>
                   <a:blip r:embed="rId8"/>
                   <a:stretch>
                     <a:fillRect/>
@@ -4891,80 +4220,6 @@
             </p:sp>
           </mc:Fallback>
         </mc:AlternateContent>
-        <p:cxnSp>
-          <p:nvCxnSpPr>
-            <p:cNvPr id="66" name="Straight Arrow Connector 65"/>
-            <p:cNvCxnSpPr/>
-            <p:nvPr/>
-          </p:nvCxnSpPr>
-          <p:spPr>
-            <a:xfrm>
-              <a:off x="1500499" y="3390850"/>
-              <a:ext cx="384744" cy="0"/>
-            </a:xfrm>
-            <a:prstGeom prst="straightConnector1">
-              <a:avLst/>
-            </a:prstGeom>
-            <a:ln w="28575">
-              <a:solidFill>
-                <a:srgbClr val="FF0000"/>
-              </a:solidFill>
-              <a:tailEnd type="arrow"/>
-            </a:ln>
-          </p:spPr>
-          <p:style>
-            <a:lnRef idx="1">
-              <a:schemeClr val="accent1"/>
-            </a:lnRef>
-            <a:fillRef idx="0">
-              <a:schemeClr val="accent1"/>
-            </a:fillRef>
-            <a:effectRef idx="0">
-              <a:schemeClr val="accent1"/>
-            </a:effectRef>
-            <a:fontRef idx="minor">
-              <a:schemeClr val="tx1"/>
-            </a:fontRef>
-          </p:style>
-        </p:cxnSp>
-        <p:sp>
-          <p:nvSpPr>
-            <p:cNvPr id="67" name="TextBox 66"/>
-            <p:cNvSpPr txBox="1"/>
-            <p:nvPr/>
-          </p:nvSpPr>
-          <p:spPr>
-            <a:xfrm>
-              <a:off x="3645027" y="1088258"/>
-              <a:ext cx="405305" cy="369332"/>
-            </a:xfrm>
-            <a:prstGeom prst="rect">
-              <a:avLst/>
-            </a:prstGeom>
-            <a:noFill/>
-          </p:spPr>
-          <p:txBody>
-            <a:bodyPr wrap="square" rtlCol="0">
-              <a:spAutoFit/>
-            </a:bodyPr>
-            <a:lstStyle/>
-            <a:p>
-              <a:r>
-                <a:rPr lang="en-US" dirty="0" smtClean="0">
-                  <a:solidFill>
-                    <a:srgbClr val="FF0000"/>
-                  </a:solidFill>
-                </a:rPr>
-                <a:t>8</a:t>
-              </a:r>
-              <a:endParaRPr lang="en-US" dirty="0">
-                <a:solidFill>
-                  <a:srgbClr val="FF0000"/>
-                </a:solidFill>
-              </a:endParaRPr>
-            </a:p>
-          </p:txBody>
-        </p:sp>
         <p:sp>
           <p:nvSpPr>
             <p:cNvPr id="68" name="TextBox 67"/>
@@ -4991,7 +4246,2322 @@
             <a:lstStyle/>
             <a:p>
               <a:r>
-                <a:rPr lang="en-US" sz="2400" smtClean="0"/>
+                <a:rPr lang="en-US" sz="2400"/>
+                <a:t>+</a:t>
+              </a:r>
+              <a:endParaRPr lang="en-US" sz="2400" dirty="0"/>
+            </a:p>
+          </p:txBody>
+        </p:sp>
+        <p:sp>
+          <p:nvSpPr>
+            <p:cNvPr id="46" name="Rectangle 45">
+              <a:extLst>
+                <a:ext uri="{FF2B5EF4-FFF2-40B4-BE49-F238E27FC236}">
+                  <a16:creationId xmlns:a16="http://schemas.microsoft.com/office/drawing/2014/main" id="{AEB8D041-6824-D748-8C0D-21E1161E201B}"/>
+                </a:ext>
+              </a:extLst>
+            </p:cNvPr>
+            <p:cNvSpPr/>
+            <p:nvPr/>
+          </p:nvSpPr>
+          <p:spPr>
+            <a:xfrm>
+              <a:off x="5324886" y="1484784"/>
+              <a:ext cx="432048" cy="432048"/>
+            </a:xfrm>
+            <a:prstGeom prst="rect">
+              <a:avLst/>
+            </a:prstGeom>
+            <a:solidFill>
+              <a:schemeClr val="bg1"/>
+            </a:solidFill>
+            <a:ln w="28575">
+              <a:solidFill>
+                <a:schemeClr val="tx1"/>
+              </a:solidFill>
+            </a:ln>
+          </p:spPr>
+          <p:style>
+            <a:lnRef idx="2">
+              <a:schemeClr val="accent1">
+                <a:shade val="50000"/>
+              </a:schemeClr>
+            </a:lnRef>
+            <a:fillRef idx="1">
+              <a:schemeClr val="accent1"/>
+            </a:fillRef>
+            <a:effectRef idx="0">
+              <a:schemeClr val="accent1"/>
+            </a:effectRef>
+            <a:fontRef idx="minor">
+              <a:schemeClr val="lt1"/>
+            </a:fontRef>
+          </p:style>
+          <p:txBody>
+            <a:bodyPr rtlCol="0" anchor="ctr"/>
+            <a:lstStyle/>
+            <a:p>
+              <a:pPr algn="ctr"/>
+              <a:endParaRPr lang="en-US" dirty="0"/>
+            </a:p>
+          </p:txBody>
+        </p:sp>
+        <mc:AlternateContent xmlns:mc="http://schemas.openxmlformats.org/markup-compatibility/2006">
+          <mc:Choice xmlns:a14="http://schemas.microsoft.com/office/drawing/2010/main" Requires="a14">
+            <p:sp>
+              <p:nvSpPr>
+                <p:cNvPr id="47" name="Rectangle 46">
+                  <a:extLst>
+                    <a:ext uri="{FF2B5EF4-FFF2-40B4-BE49-F238E27FC236}">
+                      <a16:creationId xmlns:a16="http://schemas.microsoft.com/office/drawing/2014/main" id="{0C7A5FB9-7A55-A84D-841F-48C0DA1E3BC3}"/>
+                    </a:ext>
+                  </a:extLst>
+                </p:cNvPr>
+                <p:cNvSpPr/>
+                <p:nvPr/>
+              </p:nvSpPr>
+              <p:spPr>
+                <a:xfrm>
+                  <a:off x="4961922" y="1093493"/>
+                  <a:ext cx="737638" cy="369332"/>
+                </a:xfrm>
+                <a:prstGeom prst="rect">
+                  <a:avLst/>
+                </a:prstGeom>
+              </p:spPr>
+              <p:txBody>
+                <a:bodyPr wrap="square">
+                  <a:spAutoFit/>
+                </a:bodyPr>
+                <a:lstStyle/>
+                <a:p>
+                  <a:pPr/>
+                  <a14:m>
+                    <m:oMathPara xmlns:m="http://schemas.openxmlformats.org/officeDocument/2006/math">
+                      <m:oMathParaPr>
+                        <m:jc m:val="centerGroup"/>
+                      </m:oMathParaPr>
+                      <m:oMath xmlns:m="http://schemas.openxmlformats.org/officeDocument/2006/math">
+                        <m:r>
+                          <a:rPr lang="en-US" b="0" i="1" smtClean="0">
+                            <a:latin typeface="Cambria Math" charset="0"/>
+                          </a:rPr>
+                          <m:t>𝑝</m:t>
+                        </m:r>
+                        <m:r>
+                          <a:rPr lang="en-US" b="0" i="1" smtClean="0">
+                            <a:latin typeface="Cambria Math" charset="0"/>
+                          </a:rPr>
+                          <m:t>(</m:t>
+                        </m:r>
+                        <m:r>
+                          <a:rPr lang="en-US" b="0" i="1" smtClean="0">
+                            <a:latin typeface="Cambria Math" charset="0"/>
+                          </a:rPr>
+                          <m:t>𝑤</m:t>
+                        </m:r>
+                        <m:r>
+                          <a:rPr lang="en-US" b="0" i="1" smtClean="0">
+                            <a:latin typeface="Cambria Math" charset="0"/>
+                          </a:rPr>
+                          <m:t>)</m:t>
+                        </m:r>
+                      </m:oMath>
+                    </m:oMathPara>
+                  </a14:m>
+                  <a:endParaRPr lang="en-US" dirty="0"/>
+                </a:p>
+              </p:txBody>
+            </p:sp>
+          </mc:Choice>
+          <mc:Fallback>
+            <p:sp>
+              <p:nvSpPr>
+                <p:cNvPr id="47" name="Rectangle 46">
+                  <a:extLst>
+                    <a:ext uri="{FF2B5EF4-FFF2-40B4-BE49-F238E27FC236}">
+                      <a16:creationId xmlns:a16="http://schemas.microsoft.com/office/drawing/2014/main" id="{0C7A5FB9-7A55-A84D-841F-48C0DA1E3BC3}"/>
+                    </a:ext>
+                  </a:extLst>
+                </p:cNvPr>
+                <p:cNvSpPr>
+                  <a:spLocks noRot="1" noChangeAspect="1" noMove="1" noResize="1" noEditPoints="1" noAdjustHandles="1" noChangeArrowheads="1" noChangeShapeType="1" noTextEdit="1"/>
+                </p:cNvSpPr>
+                <p:nvPr/>
+              </p:nvSpPr>
+              <p:spPr>
+                <a:xfrm>
+                  <a:off x="4961922" y="1093493"/>
+                  <a:ext cx="737638" cy="369332"/>
+                </a:xfrm>
+                <a:prstGeom prst="rect">
+                  <a:avLst/>
+                </a:prstGeom>
+                <a:blipFill>
+                  <a:blip r:embed="rId9"/>
+                  <a:stretch>
+                    <a:fillRect b="-13333"/>
+                  </a:stretch>
+                </a:blipFill>
+              </p:spPr>
+              <p:txBody>
+                <a:bodyPr/>
+                <a:lstStyle/>
+                <a:p>
+                  <a:r>
+                    <a:rPr lang="en-US">
+                      <a:noFill/>
+                    </a:rPr>
+                    <a:t> </a:t>
+                  </a:r>
+                </a:p>
+              </p:txBody>
+            </p:sp>
+          </mc:Fallback>
+        </mc:AlternateContent>
+        <p:sp>
+          <p:nvSpPr>
+            <p:cNvPr id="51" name="Rectangle 50">
+              <a:extLst>
+                <a:ext uri="{FF2B5EF4-FFF2-40B4-BE49-F238E27FC236}">
+                  <a16:creationId xmlns:a16="http://schemas.microsoft.com/office/drawing/2014/main" id="{41C285CE-6CB8-4C4C-9720-8B4A781C1B2C}"/>
+                </a:ext>
+              </a:extLst>
+            </p:cNvPr>
+            <p:cNvSpPr/>
+            <p:nvPr/>
+          </p:nvSpPr>
+          <p:spPr>
+            <a:xfrm>
+              <a:off x="6390284" y="1525017"/>
+              <a:ext cx="360040" cy="351583"/>
+            </a:xfrm>
+            <a:prstGeom prst="rect">
+              <a:avLst/>
+            </a:prstGeom>
+            <a:solidFill>
+              <a:schemeClr val="bg1"/>
+            </a:solidFill>
+            <a:ln w="28575">
+              <a:solidFill>
+                <a:schemeClr val="tx1"/>
+              </a:solidFill>
+            </a:ln>
+          </p:spPr>
+          <p:style>
+            <a:lnRef idx="2">
+              <a:schemeClr val="accent1">
+                <a:shade val="50000"/>
+              </a:schemeClr>
+            </a:lnRef>
+            <a:fillRef idx="1">
+              <a:schemeClr val="accent1"/>
+            </a:fillRef>
+            <a:effectRef idx="0">
+              <a:schemeClr val="accent1"/>
+            </a:effectRef>
+            <a:fontRef idx="minor">
+              <a:schemeClr val="lt1"/>
+            </a:fontRef>
+          </p:style>
+          <p:txBody>
+            <a:bodyPr rtlCol="0" anchor="ctr"/>
+            <a:lstStyle/>
+            <a:p>
+              <a:pPr algn="ctr"/>
+              <a:endParaRPr lang="en-US" dirty="0"/>
+            </a:p>
+          </p:txBody>
+        </p:sp>
+        <p:sp>
+          <p:nvSpPr>
+            <p:cNvPr id="52" name="TextBox 51">
+              <a:extLst>
+                <a:ext uri="{FF2B5EF4-FFF2-40B4-BE49-F238E27FC236}">
+                  <a16:creationId xmlns:a16="http://schemas.microsoft.com/office/drawing/2014/main" id="{CB8E2982-776F-C949-BAEB-3872D42324EB}"/>
+                </a:ext>
+              </a:extLst>
+            </p:cNvPr>
+            <p:cNvSpPr txBox="1"/>
+            <p:nvPr/>
+          </p:nvSpPr>
+          <p:spPr>
+            <a:xfrm>
+              <a:off x="6413722" y="1469975"/>
+              <a:ext cx="432048" cy="461665"/>
+            </a:xfrm>
+            <a:prstGeom prst="rect">
+              <a:avLst/>
+            </a:prstGeom>
+            <a:noFill/>
+            <a:ln>
+              <a:noFill/>
+            </a:ln>
+          </p:spPr>
+          <p:txBody>
+            <a:bodyPr wrap="square" rtlCol="0">
+              <a:spAutoFit/>
+            </a:bodyPr>
+            <a:lstStyle/>
+            <a:p>
+              <a:r>
+                <a:rPr lang="en-US" sz="2400" dirty="0"/>
+                <a:t>=</a:t>
+              </a:r>
+            </a:p>
+          </p:txBody>
+        </p:sp>
+        <p:cxnSp>
+          <p:nvCxnSpPr>
+            <p:cNvPr id="53" name="Straight Connector 52">
+              <a:extLst>
+                <a:ext uri="{FF2B5EF4-FFF2-40B4-BE49-F238E27FC236}">
+                  <a16:creationId xmlns:a16="http://schemas.microsoft.com/office/drawing/2014/main" id="{3031344C-9983-A240-8C0A-B71E46F07C76}"/>
+                </a:ext>
+              </a:extLst>
+            </p:cNvPr>
+            <p:cNvCxnSpPr>
+              <a:cxnSpLocks/>
+            </p:cNvCxnSpPr>
+            <p:nvPr/>
+          </p:nvCxnSpPr>
+          <p:spPr>
+            <a:xfrm>
+              <a:off x="5756934" y="1700808"/>
+              <a:ext cx="633350" cy="1"/>
+            </a:xfrm>
+            <a:prstGeom prst="line">
+              <a:avLst/>
+            </a:prstGeom>
+            <a:ln w="28575">
+              <a:solidFill>
+                <a:schemeClr val="tx1"/>
+              </a:solidFill>
+            </a:ln>
+          </p:spPr>
+          <p:style>
+            <a:lnRef idx="1">
+              <a:schemeClr val="accent1"/>
+            </a:lnRef>
+            <a:fillRef idx="0">
+              <a:schemeClr val="accent1"/>
+            </a:fillRef>
+            <a:effectRef idx="0">
+              <a:schemeClr val="accent1"/>
+            </a:effectRef>
+            <a:fontRef idx="minor">
+              <a:schemeClr val="tx1"/>
+            </a:fontRef>
+          </p:style>
+        </p:cxnSp>
+        <p:cxnSp>
+          <p:nvCxnSpPr>
+            <p:cNvPr id="54" name="Straight Connector 53">
+              <a:extLst>
+                <a:ext uri="{FF2B5EF4-FFF2-40B4-BE49-F238E27FC236}">
+                  <a16:creationId xmlns:a16="http://schemas.microsoft.com/office/drawing/2014/main" id="{58322612-3DAF-CD4E-838E-4CF5BB22FB3D}"/>
+                </a:ext>
+              </a:extLst>
+            </p:cNvPr>
+            <p:cNvCxnSpPr>
+              <a:cxnSpLocks/>
+            </p:cNvCxnSpPr>
+            <p:nvPr/>
+          </p:nvCxnSpPr>
+          <p:spPr>
+            <a:xfrm>
+              <a:off x="6750324" y="1700808"/>
+              <a:ext cx="633350" cy="0"/>
+            </a:xfrm>
+            <a:prstGeom prst="line">
+              <a:avLst/>
+            </a:prstGeom>
+            <a:ln w="28575">
+              <a:solidFill>
+                <a:schemeClr val="tx1"/>
+              </a:solidFill>
+            </a:ln>
+          </p:spPr>
+          <p:style>
+            <a:lnRef idx="1">
+              <a:schemeClr val="accent1"/>
+            </a:lnRef>
+            <a:fillRef idx="0">
+              <a:schemeClr val="accent1"/>
+            </a:fillRef>
+            <a:effectRef idx="0">
+              <a:schemeClr val="accent1"/>
+            </a:effectRef>
+            <a:fontRef idx="minor">
+              <a:schemeClr val="tx1"/>
+            </a:fontRef>
+          </p:style>
+        </p:cxnSp>
+        <p:sp>
+          <p:nvSpPr>
+            <p:cNvPr id="55" name="Rectangle 54">
+              <a:extLst>
+                <a:ext uri="{FF2B5EF4-FFF2-40B4-BE49-F238E27FC236}">
+                  <a16:creationId xmlns:a16="http://schemas.microsoft.com/office/drawing/2014/main" id="{8DDE7E34-17A1-E54B-BFBF-9EFC0BDFC1D8}"/>
+                </a:ext>
+              </a:extLst>
+            </p:cNvPr>
+            <p:cNvSpPr/>
+            <p:nvPr/>
+          </p:nvSpPr>
+          <p:spPr>
+            <a:xfrm>
+              <a:off x="6354280" y="2420888"/>
+              <a:ext cx="432048" cy="432048"/>
+            </a:xfrm>
+            <a:prstGeom prst="rect">
+              <a:avLst/>
+            </a:prstGeom>
+            <a:solidFill>
+              <a:schemeClr val="bg1"/>
+            </a:solidFill>
+            <a:ln w="28575">
+              <a:solidFill>
+                <a:schemeClr val="tx1"/>
+              </a:solidFill>
+            </a:ln>
+          </p:spPr>
+          <p:style>
+            <a:lnRef idx="2">
+              <a:schemeClr val="accent1">
+                <a:shade val="50000"/>
+              </a:schemeClr>
+            </a:lnRef>
+            <a:fillRef idx="1">
+              <a:schemeClr val="accent1"/>
+            </a:fillRef>
+            <a:effectRef idx="0">
+              <a:schemeClr val="accent1"/>
+            </a:effectRef>
+            <a:fontRef idx="minor">
+              <a:schemeClr val="lt1"/>
+            </a:fontRef>
+          </p:style>
+          <p:txBody>
+            <a:bodyPr rtlCol="0" anchor="ctr"/>
+            <a:lstStyle/>
+            <a:p>
+              <a:pPr algn="ctr"/>
+              <a:endParaRPr lang="en-US" dirty="0"/>
+            </a:p>
+          </p:txBody>
+        </p:sp>
+        <mc:AlternateContent xmlns:mc="http://schemas.openxmlformats.org/markup-compatibility/2006">
+          <mc:Choice xmlns:a14="http://schemas.microsoft.com/office/drawing/2010/main" Requires="a14">
+            <p:sp>
+              <p:nvSpPr>
+                <p:cNvPr id="56" name="Rectangle 55">
+                  <a:extLst>
+                    <a:ext uri="{FF2B5EF4-FFF2-40B4-BE49-F238E27FC236}">
+                      <a16:creationId xmlns:a16="http://schemas.microsoft.com/office/drawing/2014/main" id="{11F8781B-074A-674A-A1D6-674E8CF897E2}"/>
+                    </a:ext>
+                  </a:extLst>
+                </p:cNvPr>
+                <p:cNvSpPr/>
+                <p:nvPr/>
+              </p:nvSpPr>
+              <p:spPr>
+                <a:xfrm>
+                  <a:off x="7035460" y="1691933"/>
+                  <a:ext cx="467098" cy="369332"/>
+                </a:xfrm>
+                <a:prstGeom prst="rect">
+                  <a:avLst/>
+                </a:prstGeom>
+              </p:spPr>
+              <p:txBody>
+                <a:bodyPr wrap="square">
+                  <a:spAutoFit/>
+                </a:bodyPr>
+                <a:lstStyle/>
+                <a:p>
+                  <a:pPr/>
+                  <a14:m>
+                    <m:oMathPara xmlns:m="http://schemas.openxmlformats.org/officeDocument/2006/math">
+                      <m:oMathParaPr>
+                        <m:jc m:val="centerGroup"/>
+                      </m:oMathParaPr>
+                      <m:oMath xmlns:m="http://schemas.openxmlformats.org/officeDocument/2006/math">
+                        <m:r>
+                          <a:rPr lang="en-US" b="0" i="1" smtClean="0">
+                            <a:latin typeface="Cambria Math" charset="0"/>
+                          </a:rPr>
+                          <m:t>𝑤</m:t>
+                        </m:r>
+                      </m:oMath>
+                    </m:oMathPara>
+                  </a14:m>
+                  <a:endParaRPr lang="en-US" dirty="0"/>
+                </a:p>
+              </p:txBody>
+            </p:sp>
+          </mc:Choice>
+          <mc:Fallback>
+            <p:sp>
+              <p:nvSpPr>
+                <p:cNvPr id="56" name="Rectangle 55">
+                  <a:extLst>
+                    <a:ext uri="{FF2B5EF4-FFF2-40B4-BE49-F238E27FC236}">
+                      <a16:creationId xmlns:a16="http://schemas.microsoft.com/office/drawing/2014/main" id="{11F8781B-074A-674A-A1D6-674E8CF897E2}"/>
+                    </a:ext>
+                  </a:extLst>
+                </p:cNvPr>
+                <p:cNvSpPr>
+                  <a:spLocks noRot="1" noChangeAspect="1" noMove="1" noResize="1" noEditPoints="1" noAdjustHandles="1" noChangeArrowheads="1" noChangeShapeType="1" noTextEdit="1"/>
+                </p:cNvSpPr>
+                <p:nvPr/>
+              </p:nvSpPr>
+              <p:spPr>
+                <a:xfrm>
+                  <a:off x="7035460" y="1691933"/>
+                  <a:ext cx="467098" cy="369332"/>
+                </a:xfrm>
+                <a:prstGeom prst="rect">
+                  <a:avLst/>
+                </a:prstGeom>
+                <a:blipFill>
+                  <a:blip r:embed="rId10"/>
+                  <a:stretch>
+                    <a:fillRect/>
+                  </a:stretch>
+                </a:blipFill>
+              </p:spPr>
+              <p:txBody>
+                <a:bodyPr/>
+                <a:lstStyle/>
+                <a:p>
+                  <a:r>
+                    <a:rPr lang="en-US">
+                      <a:noFill/>
+                    </a:rPr>
+                    <a:t> </a:t>
+                  </a:r>
+                </a:p>
+              </p:txBody>
+            </p:sp>
+          </mc:Fallback>
+        </mc:AlternateContent>
+        <p:sp>
+          <p:nvSpPr>
+            <p:cNvPr id="60" name="Rectangle 59">
+              <a:extLst>
+                <a:ext uri="{FF2B5EF4-FFF2-40B4-BE49-F238E27FC236}">
+                  <a16:creationId xmlns:a16="http://schemas.microsoft.com/office/drawing/2014/main" id="{CC114B3C-0016-A24E-9713-9ADD3F3DD232}"/>
+                </a:ext>
+              </a:extLst>
+            </p:cNvPr>
+            <p:cNvSpPr/>
+            <p:nvPr/>
+          </p:nvSpPr>
+          <p:spPr>
+            <a:xfrm>
+              <a:off x="5524088" y="2533128"/>
+              <a:ext cx="232846" cy="207567"/>
+            </a:xfrm>
+            <a:prstGeom prst="rect">
+              <a:avLst/>
+            </a:prstGeom>
+            <a:solidFill>
+              <a:schemeClr val="tx1"/>
+            </a:solidFill>
+            <a:ln w="28575">
+              <a:solidFill>
+                <a:schemeClr val="tx1"/>
+              </a:solidFill>
+            </a:ln>
+          </p:spPr>
+          <p:style>
+            <a:lnRef idx="2">
+              <a:schemeClr val="accent1">
+                <a:shade val="50000"/>
+              </a:schemeClr>
+            </a:lnRef>
+            <a:fillRef idx="1">
+              <a:schemeClr val="accent1"/>
+            </a:fillRef>
+            <a:effectRef idx="0">
+              <a:schemeClr val="accent1"/>
+            </a:effectRef>
+            <a:fontRef idx="minor">
+              <a:schemeClr val="lt1"/>
+            </a:fontRef>
+          </p:style>
+          <p:txBody>
+            <a:bodyPr rtlCol="0" anchor="ctr"/>
+            <a:lstStyle/>
+            <a:p>
+              <a:pPr algn="ctr"/>
+              <a:endParaRPr lang="en-US" dirty="0"/>
+            </a:p>
+          </p:txBody>
+        </p:sp>
+        <p:cxnSp>
+          <p:nvCxnSpPr>
+            <p:cNvPr id="64" name="Straight Connector 63">
+              <a:extLst>
+                <a:ext uri="{FF2B5EF4-FFF2-40B4-BE49-F238E27FC236}">
+                  <a16:creationId xmlns:a16="http://schemas.microsoft.com/office/drawing/2014/main" id="{77D9C804-4EE7-BD41-A03E-A1471EC7BBA5}"/>
+                </a:ext>
+              </a:extLst>
+            </p:cNvPr>
+            <p:cNvCxnSpPr>
+              <a:stCxn id="60" idx="3"/>
+              <a:endCxn id="55" idx="1"/>
+            </p:cNvCxnSpPr>
+            <p:nvPr/>
+          </p:nvCxnSpPr>
+          <p:spPr>
+            <a:xfrm>
+              <a:off x="5756934" y="2636912"/>
+              <a:ext cx="597346" cy="0"/>
+            </a:xfrm>
+            <a:prstGeom prst="line">
+              <a:avLst/>
+            </a:prstGeom>
+            <a:ln w="28575">
+              <a:solidFill>
+                <a:schemeClr val="tx1"/>
+              </a:solidFill>
+            </a:ln>
+          </p:spPr>
+          <p:style>
+            <a:lnRef idx="1">
+              <a:schemeClr val="accent1"/>
+            </a:lnRef>
+            <a:fillRef idx="0">
+              <a:schemeClr val="accent1"/>
+            </a:fillRef>
+            <a:effectRef idx="0">
+              <a:schemeClr val="accent1"/>
+            </a:effectRef>
+            <a:fontRef idx="minor">
+              <a:schemeClr val="tx1"/>
+            </a:fontRef>
+          </p:style>
+        </p:cxnSp>
+        <p:cxnSp>
+          <p:nvCxnSpPr>
+            <p:cNvPr id="65" name="Straight Connector 64">
+              <a:extLst>
+                <a:ext uri="{FF2B5EF4-FFF2-40B4-BE49-F238E27FC236}">
+                  <a16:creationId xmlns:a16="http://schemas.microsoft.com/office/drawing/2014/main" id="{FB3AB3C0-BA07-E245-A386-5EB4C66BDABB}"/>
+                </a:ext>
+              </a:extLst>
+            </p:cNvPr>
+            <p:cNvCxnSpPr>
+              <a:cxnSpLocks/>
+            </p:cNvCxnSpPr>
+            <p:nvPr/>
+          </p:nvCxnSpPr>
+          <p:spPr>
+            <a:xfrm>
+              <a:off x="6570304" y="1876599"/>
+              <a:ext cx="0" cy="544289"/>
+            </a:xfrm>
+            <a:prstGeom prst="line">
+              <a:avLst/>
+            </a:prstGeom>
+            <a:ln w="28575">
+              <a:solidFill>
+                <a:schemeClr val="tx1"/>
+              </a:solidFill>
+            </a:ln>
+          </p:spPr>
+          <p:style>
+            <a:lnRef idx="1">
+              <a:schemeClr val="accent1"/>
+            </a:lnRef>
+            <a:fillRef idx="0">
+              <a:schemeClr val="accent1"/>
+            </a:fillRef>
+            <a:effectRef idx="0">
+              <a:schemeClr val="accent1"/>
+            </a:effectRef>
+            <a:fontRef idx="minor">
+              <a:schemeClr val="tx1"/>
+            </a:fontRef>
+          </p:style>
+        </p:cxnSp>
+        <p:sp>
+          <p:nvSpPr>
+            <p:cNvPr id="70" name="Rectangle 69">
+              <a:extLst>
+                <a:ext uri="{FF2B5EF4-FFF2-40B4-BE49-F238E27FC236}">
+                  <a16:creationId xmlns:a16="http://schemas.microsoft.com/office/drawing/2014/main" id="{6596939D-26F0-0C4C-AC34-1C26287C24C3}"/>
+                </a:ext>
+              </a:extLst>
+            </p:cNvPr>
+            <p:cNvSpPr/>
+            <p:nvPr/>
+          </p:nvSpPr>
+          <p:spPr>
+            <a:xfrm>
+              <a:off x="6354280" y="3397225"/>
+              <a:ext cx="432048" cy="432048"/>
+            </a:xfrm>
+            <a:prstGeom prst="rect">
+              <a:avLst/>
+            </a:prstGeom>
+            <a:solidFill>
+              <a:schemeClr val="bg1"/>
+            </a:solidFill>
+            <a:ln w="28575">
+              <a:solidFill>
+                <a:schemeClr val="tx1"/>
+              </a:solidFill>
+            </a:ln>
+          </p:spPr>
+          <p:style>
+            <a:lnRef idx="2">
+              <a:schemeClr val="accent1">
+                <a:shade val="50000"/>
+              </a:schemeClr>
+            </a:lnRef>
+            <a:fillRef idx="1">
+              <a:schemeClr val="accent1"/>
+            </a:fillRef>
+            <a:effectRef idx="0">
+              <a:schemeClr val="accent1"/>
+            </a:effectRef>
+            <a:fontRef idx="minor">
+              <a:schemeClr val="lt1"/>
+            </a:fontRef>
+          </p:style>
+          <p:txBody>
+            <a:bodyPr rtlCol="0" anchor="ctr"/>
+            <a:lstStyle/>
+            <a:p>
+              <a:pPr algn="ctr"/>
+              <a:endParaRPr lang="en-US" dirty="0"/>
+            </a:p>
+          </p:txBody>
+        </p:sp>
+        <p:cxnSp>
+          <p:nvCxnSpPr>
+            <p:cNvPr id="71" name="Straight Connector 70">
+              <a:extLst>
+                <a:ext uri="{FF2B5EF4-FFF2-40B4-BE49-F238E27FC236}">
+                  <a16:creationId xmlns:a16="http://schemas.microsoft.com/office/drawing/2014/main" id="{060E4C76-B0E1-0040-A7D7-E05D236DA9FD}"/>
+                </a:ext>
+              </a:extLst>
+            </p:cNvPr>
+            <p:cNvCxnSpPr>
+              <a:cxnSpLocks/>
+            </p:cNvCxnSpPr>
+            <p:nvPr/>
+          </p:nvCxnSpPr>
+          <p:spPr>
+            <a:xfrm>
+              <a:off x="6570304" y="2852936"/>
+              <a:ext cx="0" cy="544289"/>
+            </a:xfrm>
+            <a:prstGeom prst="line">
+              <a:avLst/>
+            </a:prstGeom>
+            <a:ln w="28575">
+              <a:solidFill>
+                <a:schemeClr val="tx1"/>
+              </a:solidFill>
+            </a:ln>
+          </p:spPr>
+          <p:style>
+            <a:lnRef idx="1">
+              <a:schemeClr val="accent1"/>
+            </a:lnRef>
+            <a:fillRef idx="0">
+              <a:schemeClr val="accent1"/>
+            </a:fillRef>
+            <a:effectRef idx="0">
+              <a:schemeClr val="accent1"/>
+            </a:effectRef>
+            <a:fontRef idx="minor">
+              <a:schemeClr val="tx1"/>
+            </a:fontRef>
+          </p:style>
+        </p:cxnSp>
+        <p:cxnSp>
+          <p:nvCxnSpPr>
+            <p:cNvPr id="72" name="Straight Connector 71">
+              <a:extLst>
+                <a:ext uri="{FF2B5EF4-FFF2-40B4-BE49-F238E27FC236}">
+                  <a16:creationId xmlns:a16="http://schemas.microsoft.com/office/drawing/2014/main" id="{3B1C1E6D-4E6F-C440-B653-D8722C47334B}"/>
+                </a:ext>
+              </a:extLst>
+            </p:cNvPr>
+            <p:cNvCxnSpPr>
+              <a:cxnSpLocks/>
+            </p:cNvCxnSpPr>
+            <p:nvPr/>
+          </p:nvCxnSpPr>
+          <p:spPr>
+            <a:xfrm>
+              <a:off x="6570304" y="3829273"/>
+              <a:ext cx="0" cy="544289"/>
+            </a:xfrm>
+            <a:prstGeom prst="line">
+              <a:avLst/>
+            </a:prstGeom>
+            <a:ln w="28575">
+              <a:solidFill>
+                <a:schemeClr val="tx1"/>
+              </a:solidFill>
+            </a:ln>
+          </p:spPr>
+          <p:style>
+            <a:lnRef idx="1">
+              <a:schemeClr val="accent1"/>
+            </a:lnRef>
+            <a:fillRef idx="0">
+              <a:schemeClr val="accent1"/>
+            </a:fillRef>
+            <a:effectRef idx="0">
+              <a:schemeClr val="accent1"/>
+            </a:effectRef>
+            <a:fontRef idx="minor">
+              <a:schemeClr val="tx1"/>
+            </a:fontRef>
+          </p:style>
+        </p:cxnSp>
+        <p:sp>
+          <p:nvSpPr>
+            <p:cNvPr id="73" name="Rectangle 72">
+              <a:extLst>
+                <a:ext uri="{FF2B5EF4-FFF2-40B4-BE49-F238E27FC236}">
+                  <a16:creationId xmlns:a16="http://schemas.microsoft.com/office/drawing/2014/main" id="{06B04B5E-49C0-C040-AC58-64D388A25B79}"/>
+                </a:ext>
+              </a:extLst>
+            </p:cNvPr>
+            <p:cNvSpPr/>
+            <p:nvPr/>
+          </p:nvSpPr>
+          <p:spPr>
+            <a:xfrm>
+              <a:off x="6453881" y="4373562"/>
+              <a:ext cx="232846" cy="207567"/>
+            </a:xfrm>
+            <a:prstGeom prst="rect">
+              <a:avLst/>
+            </a:prstGeom>
+            <a:solidFill>
+              <a:schemeClr val="tx1"/>
+            </a:solidFill>
+            <a:ln w="28575">
+              <a:solidFill>
+                <a:schemeClr val="tx1"/>
+              </a:solidFill>
+            </a:ln>
+          </p:spPr>
+          <p:style>
+            <a:lnRef idx="2">
+              <a:schemeClr val="accent1">
+                <a:shade val="50000"/>
+              </a:schemeClr>
+            </a:lnRef>
+            <a:fillRef idx="1">
+              <a:schemeClr val="accent1"/>
+            </a:fillRef>
+            <a:effectRef idx="0">
+              <a:schemeClr val="accent1"/>
+            </a:effectRef>
+            <a:fontRef idx="minor">
+              <a:schemeClr val="lt1"/>
+            </a:fontRef>
+          </p:style>
+          <p:txBody>
+            <a:bodyPr rtlCol="0" anchor="ctr"/>
+            <a:lstStyle/>
+            <a:p>
+              <a:pPr algn="ctr"/>
+              <a:endParaRPr lang="en-US" dirty="0"/>
+            </a:p>
+          </p:txBody>
+        </p:sp>
+        <p:sp>
+          <p:nvSpPr>
+            <p:cNvPr id="74" name="Oval 73">
+              <a:extLst>
+                <a:ext uri="{FF2B5EF4-FFF2-40B4-BE49-F238E27FC236}">
+                  <a16:creationId xmlns:a16="http://schemas.microsoft.com/office/drawing/2014/main" id="{43B40543-CD23-7347-A32E-51EFF0FD4635}"/>
+                </a:ext>
+              </a:extLst>
+            </p:cNvPr>
+            <p:cNvSpPr/>
+            <p:nvPr/>
+          </p:nvSpPr>
+          <p:spPr>
+            <a:xfrm>
+              <a:off x="6534300" y="2609365"/>
+              <a:ext cx="72008" cy="72008"/>
+            </a:xfrm>
+            <a:prstGeom prst="ellipse">
+              <a:avLst/>
+            </a:prstGeom>
+            <a:ln>
+              <a:solidFill>
+                <a:schemeClr val="tx1"/>
+              </a:solidFill>
+            </a:ln>
+          </p:spPr>
+          <p:style>
+            <a:lnRef idx="2">
+              <a:schemeClr val="accent1">
+                <a:shade val="50000"/>
+              </a:schemeClr>
+            </a:lnRef>
+            <a:fillRef idx="1">
+              <a:schemeClr val="accent1"/>
+            </a:fillRef>
+            <a:effectRef idx="0">
+              <a:schemeClr val="accent1"/>
+            </a:effectRef>
+            <a:fontRef idx="minor">
+              <a:schemeClr val="lt1"/>
+            </a:fontRef>
+          </p:style>
+          <p:txBody>
+            <a:bodyPr rtlCol="0" anchor="ctr"/>
+            <a:lstStyle/>
+            <a:p>
+              <a:pPr algn="ctr"/>
+              <a:endParaRPr lang="en-US"/>
+            </a:p>
+          </p:txBody>
+        </p:sp>
+        <mc:AlternateContent xmlns:mc="http://schemas.openxmlformats.org/markup-compatibility/2006">
+          <mc:Choice xmlns:a14="http://schemas.microsoft.com/office/drawing/2010/main" Requires="a14">
+            <p:sp>
+              <p:nvSpPr>
+                <p:cNvPr id="75" name="Rectangle 74">
+                  <a:extLst>
+                    <a:ext uri="{FF2B5EF4-FFF2-40B4-BE49-F238E27FC236}">
+                      <a16:creationId xmlns:a16="http://schemas.microsoft.com/office/drawing/2014/main" id="{8B9C476D-7490-BF4C-BFB7-6AD383C79A34}"/>
+                    </a:ext>
+                  </a:extLst>
+                </p:cNvPr>
+                <p:cNvSpPr/>
+                <p:nvPr/>
+              </p:nvSpPr>
+              <p:spPr>
+                <a:xfrm>
+                  <a:off x="5832052" y="2609365"/>
+                  <a:ext cx="367985" cy="369332"/>
+                </a:xfrm>
+                <a:prstGeom prst="rect">
+                  <a:avLst/>
+                </a:prstGeom>
+                <a:ln>
+                  <a:noFill/>
+                </a:ln>
+              </p:spPr>
+              <p:txBody>
+                <a:bodyPr wrap="square">
+                  <a:spAutoFit/>
+                </a:bodyPr>
+                <a:lstStyle/>
+                <a:p>
+                  <a:pPr/>
+                  <a14:m>
+                    <m:oMathPara xmlns:m="http://schemas.openxmlformats.org/officeDocument/2006/math">
+                      <m:oMathParaPr>
+                        <m:jc m:val="centerGroup"/>
+                      </m:oMathParaPr>
+                      <m:oMath xmlns:m="http://schemas.openxmlformats.org/officeDocument/2006/math">
+                        <m:r>
+                          <a:rPr lang="en-US" b="0" i="1" smtClean="0">
+                            <a:latin typeface="Cambria Math" charset="0"/>
+                          </a:rPr>
+                          <m:t>𝑥</m:t>
+                        </m:r>
+                      </m:oMath>
+                    </m:oMathPara>
+                  </a14:m>
+                  <a:endParaRPr lang="en-US" dirty="0"/>
+                </a:p>
+              </p:txBody>
+            </p:sp>
+          </mc:Choice>
+          <mc:Fallback>
+            <p:sp>
+              <p:nvSpPr>
+                <p:cNvPr id="75" name="Rectangle 74">
+                  <a:extLst>
+                    <a:ext uri="{FF2B5EF4-FFF2-40B4-BE49-F238E27FC236}">
+                      <a16:creationId xmlns:a16="http://schemas.microsoft.com/office/drawing/2014/main" id="{8B9C476D-7490-BF4C-BFB7-6AD383C79A34}"/>
+                    </a:ext>
+                  </a:extLst>
+                </p:cNvPr>
+                <p:cNvSpPr>
+                  <a:spLocks noRot="1" noChangeAspect="1" noMove="1" noResize="1" noEditPoints="1" noAdjustHandles="1" noChangeArrowheads="1" noChangeShapeType="1" noTextEdit="1"/>
+                </p:cNvSpPr>
+                <p:nvPr/>
+              </p:nvSpPr>
+              <p:spPr>
+                <a:xfrm>
+                  <a:off x="5832052" y="2609365"/>
+                  <a:ext cx="367985" cy="369332"/>
+                </a:xfrm>
+                <a:prstGeom prst="rect">
+                  <a:avLst/>
+                </a:prstGeom>
+                <a:blipFill>
+                  <a:blip r:embed="rId11"/>
+                  <a:stretch>
+                    <a:fillRect/>
+                  </a:stretch>
+                </a:blipFill>
+                <a:ln>
+                  <a:noFill/>
+                </a:ln>
+              </p:spPr>
+              <p:txBody>
+                <a:bodyPr/>
+                <a:lstStyle/>
+                <a:p>
+                  <a:r>
+                    <a:rPr lang="en-US">
+                      <a:noFill/>
+                    </a:rPr>
+                    <a:t> </a:t>
+                  </a:r>
+                </a:p>
+              </p:txBody>
+            </p:sp>
+          </mc:Fallback>
+        </mc:AlternateContent>
+        <p:cxnSp>
+          <p:nvCxnSpPr>
+            <p:cNvPr id="76" name="Straight Connector 75">
+              <a:extLst>
+                <a:ext uri="{FF2B5EF4-FFF2-40B4-BE49-F238E27FC236}">
+                  <a16:creationId xmlns:a16="http://schemas.microsoft.com/office/drawing/2014/main" id="{54817CE1-A3BD-CE48-8C5D-48262392D244}"/>
+                </a:ext>
+              </a:extLst>
+            </p:cNvPr>
+            <p:cNvCxnSpPr>
+              <a:cxnSpLocks/>
+            </p:cNvCxnSpPr>
+            <p:nvPr/>
+          </p:nvCxnSpPr>
+          <p:spPr>
+            <a:xfrm>
+              <a:off x="5756934" y="3622126"/>
+              <a:ext cx="597346" cy="0"/>
+            </a:xfrm>
+            <a:prstGeom prst="line">
+              <a:avLst/>
+            </a:prstGeom>
+            <a:ln w="28575">
+              <a:solidFill>
+                <a:schemeClr val="tx1"/>
+              </a:solidFill>
+            </a:ln>
+          </p:spPr>
+          <p:style>
+            <a:lnRef idx="1">
+              <a:schemeClr val="accent1"/>
+            </a:lnRef>
+            <a:fillRef idx="0">
+              <a:schemeClr val="accent1"/>
+            </a:fillRef>
+            <a:effectRef idx="0">
+              <a:schemeClr val="accent1"/>
+            </a:effectRef>
+            <a:fontRef idx="minor">
+              <a:schemeClr val="tx1"/>
+            </a:fontRef>
+          </p:style>
+        </p:cxnSp>
+        <p:sp>
+          <p:nvSpPr>
+            <p:cNvPr id="77" name="Rectangle 76">
+              <a:extLst>
+                <a:ext uri="{FF2B5EF4-FFF2-40B4-BE49-F238E27FC236}">
+                  <a16:creationId xmlns:a16="http://schemas.microsoft.com/office/drawing/2014/main" id="{6A8CFE9D-88CA-4D4F-B4CB-610306396845}"/>
+                </a:ext>
+              </a:extLst>
+            </p:cNvPr>
+            <p:cNvSpPr/>
+            <p:nvPr/>
+          </p:nvSpPr>
+          <p:spPr>
+            <a:xfrm>
+              <a:off x="4494694" y="3509465"/>
+              <a:ext cx="232846" cy="207567"/>
+            </a:xfrm>
+            <a:prstGeom prst="rect">
+              <a:avLst/>
+            </a:prstGeom>
+            <a:solidFill>
+              <a:schemeClr val="tx1"/>
+            </a:solidFill>
+            <a:ln w="28575">
+              <a:solidFill>
+                <a:schemeClr val="tx1"/>
+              </a:solidFill>
+            </a:ln>
+          </p:spPr>
+          <p:style>
+            <a:lnRef idx="2">
+              <a:schemeClr val="accent1">
+                <a:shade val="50000"/>
+              </a:schemeClr>
+            </a:lnRef>
+            <a:fillRef idx="1">
+              <a:schemeClr val="accent1"/>
+            </a:fillRef>
+            <a:effectRef idx="0">
+              <a:schemeClr val="accent1"/>
+            </a:effectRef>
+            <a:fontRef idx="minor">
+              <a:schemeClr val="lt1"/>
+            </a:fontRef>
+          </p:style>
+          <p:txBody>
+            <a:bodyPr rtlCol="0" anchor="ctr"/>
+            <a:lstStyle/>
+            <a:p>
+              <a:pPr algn="ctr"/>
+              <a:endParaRPr lang="en-US" dirty="0"/>
+            </a:p>
+          </p:txBody>
+        </p:sp>
+        <mc:AlternateContent xmlns:mc="http://schemas.openxmlformats.org/markup-compatibility/2006">
+          <mc:Choice xmlns:a14="http://schemas.microsoft.com/office/drawing/2010/main" Requires="a14">
+            <p:sp>
+              <p:nvSpPr>
+                <p:cNvPr id="78" name="Rectangle 77">
+                  <a:extLst>
+                    <a:ext uri="{FF2B5EF4-FFF2-40B4-BE49-F238E27FC236}">
+                      <a16:creationId xmlns:a16="http://schemas.microsoft.com/office/drawing/2014/main" id="{B62FA317-A99B-BF4F-B03B-A423B1D2D2C9}"/>
+                    </a:ext>
+                  </a:extLst>
+                </p:cNvPr>
+                <p:cNvSpPr/>
+                <p:nvPr/>
+              </p:nvSpPr>
+              <p:spPr>
+                <a:xfrm>
+                  <a:off x="6584503" y="3916751"/>
+                  <a:ext cx="367985" cy="369332"/>
+                </a:xfrm>
+                <a:prstGeom prst="rect">
+                  <a:avLst/>
+                </a:prstGeom>
+                <a:ln>
+                  <a:noFill/>
+                </a:ln>
+              </p:spPr>
+              <p:txBody>
+                <a:bodyPr wrap="square">
+                  <a:spAutoFit/>
+                </a:bodyPr>
+                <a:lstStyle/>
+                <a:p>
+                  <a:pPr/>
+                  <a14:m>
+                    <m:oMathPara xmlns:m="http://schemas.openxmlformats.org/officeDocument/2006/math">
+                      <m:oMathParaPr>
+                        <m:jc m:val="centerGroup"/>
+                      </m:oMathParaPr>
+                      <m:oMath xmlns:m="http://schemas.openxmlformats.org/officeDocument/2006/math">
+                        <m:r>
+                          <a:rPr lang="en-US" b="0" i="1" smtClean="0">
+                            <a:latin typeface="Cambria Math" charset="0"/>
+                          </a:rPr>
+                          <m:t>𝑦</m:t>
+                        </m:r>
+                      </m:oMath>
+                    </m:oMathPara>
+                  </a14:m>
+                  <a:endParaRPr lang="en-US" dirty="0"/>
+                </a:p>
+              </p:txBody>
+            </p:sp>
+          </mc:Choice>
+          <mc:Fallback>
+            <p:sp>
+              <p:nvSpPr>
+                <p:cNvPr id="78" name="Rectangle 77">
+                  <a:extLst>
+                    <a:ext uri="{FF2B5EF4-FFF2-40B4-BE49-F238E27FC236}">
+                      <a16:creationId xmlns:a16="http://schemas.microsoft.com/office/drawing/2014/main" id="{B62FA317-A99B-BF4F-B03B-A423B1D2D2C9}"/>
+                    </a:ext>
+                  </a:extLst>
+                </p:cNvPr>
+                <p:cNvSpPr>
+                  <a:spLocks noRot="1" noChangeAspect="1" noMove="1" noResize="1" noEditPoints="1" noAdjustHandles="1" noChangeArrowheads="1" noChangeShapeType="1" noTextEdit="1"/>
+                </p:cNvSpPr>
+                <p:nvPr/>
+              </p:nvSpPr>
+              <p:spPr>
+                <a:xfrm>
+                  <a:off x="6584503" y="3916751"/>
+                  <a:ext cx="367985" cy="369332"/>
+                </a:xfrm>
+                <a:prstGeom prst="rect">
+                  <a:avLst/>
+                </a:prstGeom>
+                <a:blipFill>
+                  <a:blip r:embed="rId12"/>
+                  <a:stretch>
+                    <a:fillRect b="-6667"/>
+                  </a:stretch>
+                </a:blipFill>
+                <a:ln>
+                  <a:noFill/>
+                </a:ln>
+              </p:spPr>
+              <p:txBody>
+                <a:bodyPr/>
+                <a:lstStyle/>
+                <a:p>
+                  <a:r>
+                    <a:rPr lang="en-US">
+                      <a:noFill/>
+                    </a:rPr>
+                    <a:t> </a:t>
+                  </a:r>
+                </a:p>
+              </p:txBody>
+            </p:sp>
+          </mc:Fallback>
+        </mc:AlternateContent>
+        <mc:AlternateContent xmlns:mc="http://schemas.openxmlformats.org/markup-compatibility/2006">
+          <mc:Choice xmlns:a14="http://schemas.microsoft.com/office/drawing/2010/main" Requires="a14">
+            <p:sp>
+              <p:nvSpPr>
+                <p:cNvPr id="79" name="Rectangle 78">
+                  <a:extLst>
+                    <a:ext uri="{FF2B5EF4-FFF2-40B4-BE49-F238E27FC236}">
+                      <a16:creationId xmlns:a16="http://schemas.microsoft.com/office/drawing/2014/main" id="{ED25579C-F7A6-3D4F-8D47-CEEFBA7415BE}"/>
+                    </a:ext>
+                  </a:extLst>
+                </p:cNvPr>
+                <p:cNvSpPr/>
+                <p:nvPr/>
+              </p:nvSpPr>
+              <p:spPr>
+                <a:xfrm>
+                  <a:off x="4791237" y="3613248"/>
+                  <a:ext cx="493084" cy="369332"/>
+                </a:xfrm>
+                <a:prstGeom prst="rect">
+                  <a:avLst/>
+                </a:prstGeom>
+                <a:ln>
+                  <a:noFill/>
+                </a:ln>
+              </p:spPr>
+              <p:txBody>
+                <a:bodyPr wrap="square">
+                  <a:spAutoFit/>
+                </a:bodyPr>
+                <a:lstStyle/>
+                <a:p>
+                  <a:pPr/>
+                  <a14:m>
+                    <m:oMathPara xmlns:m="http://schemas.openxmlformats.org/officeDocument/2006/math">
+                      <m:oMathParaPr>
+                        <m:jc m:val="centerGroup"/>
+                      </m:oMathParaPr>
+                      <m:oMath xmlns:m="http://schemas.openxmlformats.org/officeDocument/2006/math">
+                        <m:sSup>
+                          <m:sSupPr>
+                            <m:ctrlPr>
+                              <a:rPr lang="en-US" b="0" i="1" smtClean="0">
+                                <a:latin typeface="Cambria Math" panose="02040503050406030204" pitchFamily="18" charset="0"/>
+                              </a:rPr>
+                            </m:ctrlPr>
+                          </m:sSupPr>
+                          <m:e>
+                            <m:r>
+                              <a:rPr lang="en-US" b="0" i="1" smtClean="0">
+                                <a:latin typeface="Cambria Math" charset="0"/>
+                                <a:ea typeface="Cambria Math" charset="0"/>
+                                <a:cs typeface="Cambria Math" charset="0"/>
+                              </a:rPr>
+                              <m:t>𝜎</m:t>
+                            </m:r>
+                          </m:e>
+                          <m:sup>
+                            <m:r>
+                              <a:rPr lang="en-US" b="0" i="1" smtClean="0">
+                                <a:latin typeface="Cambria Math" charset="0"/>
+                              </a:rPr>
+                              <m:t>2</m:t>
+                            </m:r>
+                          </m:sup>
+                        </m:sSup>
+                      </m:oMath>
+                    </m:oMathPara>
+                  </a14:m>
+                  <a:endParaRPr lang="en-US" dirty="0"/>
+                </a:p>
+              </p:txBody>
+            </p:sp>
+          </mc:Choice>
+          <mc:Fallback>
+            <p:sp>
+              <p:nvSpPr>
+                <p:cNvPr id="79" name="Rectangle 78">
+                  <a:extLst>
+                    <a:ext uri="{FF2B5EF4-FFF2-40B4-BE49-F238E27FC236}">
+                      <a16:creationId xmlns:a16="http://schemas.microsoft.com/office/drawing/2014/main" id="{ED25579C-F7A6-3D4F-8D47-CEEFBA7415BE}"/>
+                    </a:ext>
+                  </a:extLst>
+                </p:cNvPr>
+                <p:cNvSpPr>
+                  <a:spLocks noRot="1" noChangeAspect="1" noMove="1" noResize="1" noEditPoints="1" noAdjustHandles="1" noChangeArrowheads="1" noChangeShapeType="1" noTextEdit="1"/>
+                </p:cNvSpPr>
+                <p:nvPr/>
+              </p:nvSpPr>
+              <p:spPr>
+                <a:xfrm>
+                  <a:off x="4791237" y="3613248"/>
+                  <a:ext cx="493084" cy="369332"/>
+                </a:xfrm>
+                <a:prstGeom prst="rect">
+                  <a:avLst/>
+                </a:prstGeom>
+                <a:blipFill>
+                  <a:blip r:embed="rId13"/>
+                  <a:stretch>
+                    <a:fillRect/>
+                  </a:stretch>
+                </a:blipFill>
+                <a:ln>
+                  <a:noFill/>
+                </a:ln>
+              </p:spPr>
+              <p:txBody>
+                <a:bodyPr/>
+                <a:lstStyle/>
+                <a:p>
+                  <a:r>
+                    <a:rPr lang="en-US">
+                      <a:noFill/>
+                    </a:rPr>
+                    <a:t> </a:t>
+                  </a:r>
+                </a:p>
+              </p:txBody>
+            </p:sp>
+          </mc:Fallback>
+        </mc:AlternateContent>
+        <p:cxnSp>
+          <p:nvCxnSpPr>
+            <p:cNvPr id="80" name="Straight Arrow Connector 79">
+              <a:extLst>
+                <a:ext uri="{FF2B5EF4-FFF2-40B4-BE49-F238E27FC236}">
+                  <a16:creationId xmlns:a16="http://schemas.microsoft.com/office/drawing/2014/main" id="{8D10FEE1-6129-0C42-9AAB-3F389059B602}"/>
+                </a:ext>
+              </a:extLst>
+            </p:cNvPr>
+            <p:cNvCxnSpPr>
+              <a:cxnSpLocks/>
+            </p:cNvCxnSpPr>
+            <p:nvPr/>
+          </p:nvCxnSpPr>
+          <p:spPr>
+            <a:xfrm>
+              <a:off x="5886228" y="1331476"/>
+              <a:ext cx="504056" cy="0"/>
+            </a:xfrm>
+            <a:prstGeom prst="straightConnector1">
+              <a:avLst/>
+            </a:prstGeom>
+            <a:ln w="28575">
+              <a:solidFill>
+                <a:srgbClr val="FF0000"/>
+              </a:solidFill>
+              <a:tailEnd type="arrow"/>
+            </a:ln>
+          </p:spPr>
+          <p:style>
+            <a:lnRef idx="1">
+              <a:schemeClr val="accent1"/>
+            </a:lnRef>
+            <a:fillRef idx="0">
+              <a:schemeClr val="accent1"/>
+            </a:fillRef>
+            <a:effectRef idx="0">
+              <a:schemeClr val="accent1"/>
+            </a:effectRef>
+            <a:fontRef idx="minor">
+              <a:schemeClr val="tx1"/>
+            </a:fontRef>
+          </p:style>
+        </p:cxnSp>
+        <p:cxnSp>
+          <p:nvCxnSpPr>
+            <p:cNvPr id="81" name="Straight Arrow Connector 80">
+              <a:extLst>
+                <a:ext uri="{FF2B5EF4-FFF2-40B4-BE49-F238E27FC236}">
+                  <a16:creationId xmlns:a16="http://schemas.microsoft.com/office/drawing/2014/main" id="{2B5373B9-8B69-2B45-9A85-12D561246585}"/>
+                </a:ext>
+              </a:extLst>
+            </p:cNvPr>
+            <p:cNvCxnSpPr>
+              <a:cxnSpLocks/>
+            </p:cNvCxnSpPr>
+            <p:nvPr/>
+          </p:nvCxnSpPr>
+          <p:spPr>
+            <a:xfrm>
+              <a:off x="5764016" y="2405573"/>
+              <a:ext cx="504056" cy="0"/>
+            </a:xfrm>
+            <a:prstGeom prst="straightConnector1">
+              <a:avLst/>
+            </a:prstGeom>
+            <a:ln w="28575">
+              <a:solidFill>
+                <a:srgbClr val="FF0000"/>
+              </a:solidFill>
+              <a:tailEnd type="arrow"/>
+            </a:ln>
+          </p:spPr>
+          <p:style>
+            <a:lnRef idx="1">
+              <a:schemeClr val="accent1"/>
+            </a:lnRef>
+            <a:fillRef idx="0">
+              <a:schemeClr val="accent1"/>
+            </a:fillRef>
+            <a:effectRef idx="0">
+              <a:schemeClr val="accent1"/>
+            </a:effectRef>
+            <a:fontRef idx="minor">
+              <a:schemeClr val="tx1"/>
+            </a:fontRef>
+          </p:style>
+        </p:cxnSp>
+        <p:cxnSp>
+          <p:nvCxnSpPr>
+            <p:cNvPr id="82" name="Straight Arrow Connector 81">
+              <a:extLst>
+                <a:ext uri="{FF2B5EF4-FFF2-40B4-BE49-F238E27FC236}">
+                  <a16:creationId xmlns:a16="http://schemas.microsoft.com/office/drawing/2014/main" id="{48610B99-B9BD-2F4C-8851-8F389AC3896A}"/>
+                </a:ext>
+              </a:extLst>
+            </p:cNvPr>
+            <p:cNvCxnSpPr>
+              <a:cxnSpLocks/>
+            </p:cNvCxnSpPr>
+            <p:nvPr/>
+          </p:nvCxnSpPr>
+          <p:spPr>
+            <a:xfrm>
+              <a:off x="5909488" y="3397225"/>
+              <a:ext cx="384744" cy="0"/>
+            </a:xfrm>
+            <a:prstGeom prst="straightConnector1">
+              <a:avLst/>
+            </a:prstGeom>
+            <a:ln w="28575">
+              <a:solidFill>
+                <a:srgbClr val="FF0000"/>
+              </a:solidFill>
+              <a:tailEnd type="arrow"/>
+            </a:ln>
+          </p:spPr>
+          <p:style>
+            <a:lnRef idx="1">
+              <a:schemeClr val="accent1"/>
+            </a:lnRef>
+            <a:fillRef idx="0">
+              <a:schemeClr val="accent1"/>
+            </a:fillRef>
+            <a:effectRef idx="0">
+              <a:schemeClr val="accent1"/>
+            </a:effectRef>
+            <a:fontRef idx="minor">
+              <a:schemeClr val="tx1"/>
+            </a:fontRef>
+          </p:style>
+        </p:cxnSp>
+        <p:cxnSp>
+          <p:nvCxnSpPr>
+            <p:cNvPr id="83" name="Straight Arrow Connector 82">
+              <a:extLst>
+                <a:ext uri="{FF2B5EF4-FFF2-40B4-BE49-F238E27FC236}">
+                  <a16:creationId xmlns:a16="http://schemas.microsoft.com/office/drawing/2014/main" id="{E89A7D8C-B63D-3240-9689-2CF6E849ADFA}"/>
+                </a:ext>
+              </a:extLst>
+            </p:cNvPr>
+            <p:cNvCxnSpPr>
+              <a:cxnSpLocks/>
+            </p:cNvCxnSpPr>
+            <p:nvPr/>
+          </p:nvCxnSpPr>
+          <p:spPr>
+            <a:xfrm>
+              <a:off x="6814971" y="1447510"/>
+              <a:ext cx="504056" cy="0"/>
+            </a:xfrm>
+            <a:prstGeom prst="straightConnector1">
+              <a:avLst/>
+            </a:prstGeom>
+            <a:ln w="28575">
+              <a:solidFill>
+                <a:srgbClr val="FF0000"/>
+              </a:solidFill>
+              <a:tailEnd type="arrow"/>
+            </a:ln>
+          </p:spPr>
+          <p:style>
+            <a:lnRef idx="1">
+              <a:schemeClr val="accent1"/>
+            </a:lnRef>
+            <a:fillRef idx="0">
+              <a:schemeClr val="accent1"/>
+            </a:fillRef>
+            <a:effectRef idx="0">
+              <a:schemeClr val="accent1"/>
+            </a:effectRef>
+            <a:fontRef idx="minor">
+              <a:schemeClr val="tx1"/>
+            </a:fontRef>
+          </p:style>
+        </p:cxnSp>
+        <p:cxnSp>
+          <p:nvCxnSpPr>
+            <p:cNvPr id="84" name="Straight Arrow Connector 83">
+              <a:extLst>
+                <a:ext uri="{FF2B5EF4-FFF2-40B4-BE49-F238E27FC236}">
+                  <a16:creationId xmlns:a16="http://schemas.microsoft.com/office/drawing/2014/main" id="{CD77A614-D5C5-294E-B0DE-912632164E83}"/>
+                </a:ext>
+              </a:extLst>
+            </p:cNvPr>
+            <p:cNvCxnSpPr>
+              <a:cxnSpLocks/>
+            </p:cNvCxnSpPr>
+            <p:nvPr/>
+          </p:nvCxnSpPr>
+          <p:spPr>
+            <a:xfrm flipV="1">
+              <a:off x="6956107" y="3806792"/>
+              <a:ext cx="0" cy="384386"/>
+            </a:xfrm>
+            <a:prstGeom prst="straightConnector1">
+              <a:avLst/>
+            </a:prstGeom>
+            <a:ln w="28575">
+              <a:solidFill>
+                <a:srgbClr val="FF0000"/>
+              </a:solidFill>
+              <a:tailEnd type="arrow"/>
+            </a:ln>
+          </p:spPr>
+          <p:style>
+            <a:lnRef idx="1">
+              <a:schemeClr val="accent1"/>
+            </a:lnRef>
+            <a:fillRef idx="0">
+              <a:schemeClr val="accent1"/>
+            </a:fillRef>
+            <a:effectRef idx="0">
+              <a:schemeClr val="accent1"/>
+            </a:effectRef>
+            <a:fontRef idx="minor">
+              <a:schemeClr val="tx1"/>
+            </a:fontRef>
+          </p:style>
+        </p:cxnSp>
+        <p:cxnSp>
+          <p:nvCxnSpPr>
+            <p:cNvPr id="85" name="Straight Arrow Connector 84">
+              <a:extLst>
+                <a:ext uri="{FF2B5EF4-FFF2-40B4-BE49-F238E27FC236}">
+                  <a16:creationId xmlns:a16="http://schemas.microsoft.com/office/drawing/2014/main" id="{D571DBC7-24A9-064C-AD62-FCD4A952DBA0}"/>
+                </a:ext>
+              </a:extLst>
+            </p:cNvPr>
+            <p:cNvCxnSpPr>
+              <a:cxnSpLocks/>
+            </p:cNvCxnSpPr>
+            <p:nvPr/>
+          </p:nvCxnSpPr>
+          <p:spPr>
+            <a:xfrm flipV="1">
+              <a:off x="6846377" y="2932887"/>
+              <a:ext cx="0" cy="384386"/>
+            </a:xfrm>
+            <a:prstGeom prst="straightConnector1">
+              <a:avLst/>
+            </a:prstGeom>
+            <a:ln w="28575">
+              <a:solidFill>
+                <a:srgbClr val="FF0000"/>
+              </a:solidFill>
+              <a:tailEnd type="arrow"/>
+            </a:ln>
+          </p:spPr>
+          <p:style>
+            <a:lnRef idx="1">
+              <a:schemeClr val="accent1"/>
+            </a:lnRef>
+            <a:fillRef idx="0">
+              <a:schemeClr val="accent1"/>
+            </a:fillRef>
+            <a:effectRef idx="0">
+              <a:schemeClr val="accent1"/>
+            </a:effectRef>
+            <a:fontRef idx="minor">
+              <a:schemeClr val="tx1"/>
+            </a:fontRef>
+          </p:style>
+        </p:cxnSp>
+        <p:cxnSp>
+          <p:nvCxnSpPr>
+            <p:cNvPr id="86" name="Straight Arrow Connector 85">
+              <a:extLst>
+                <a:ext uri="{FF2B5EF4-FFF2-40B4-BE49-F238E27FC236}">
+                  <a16:creationId xmlns:a16="http://schemas.microsoft.com/office/drawing/2014/main" id="{0003C38E-EBFB-FC4E-BB2B-3E39F9A3ADFD}"/>
+                </a:ext>
+              </a:extLst>
+            </p:cNvPr>
+            <p:cNvCxnSpPr>
+              <a:cxnSpLocks/>
+            </p:cNvCxnSpPr>
+            <p:nvPr/>
+          </p:nvCxnSpPr>
+          <p:spPr>
+            <a:xfrm flipV="1">
+              <a:off x="6815578" y="1931640"/>
+              <a:ext cx="0" cy="384386"/>
+            </a:xfrm>
+            <a:prstGeom prst="straightConnector1">
+              <a:avLst/>
+            </a:prstGeom>
+            <a:ln w="28575">
+              <a:solidFill>
+                <a:srgbClr val="FF0000"/>
+              </a:solidFill>
+              <a:tailEnd type="arrow"/>
+            </a:ln>
+          </p:spPr>
+          <p:style>
+            <a:lnRef idx="1">
+              <a:schemeClr val="accent1"/>
+            </a:lnRef>
+            <a:fillRef idx="0">
+              <a:schemeClr val="accent1"/>
+            </a:fillRef>
+            <a:effectRef idx="0">
+              <a:schemeClr val="accent1"/>
+            </a:effectRef>
+            <a:fontRef idx="minor">
+              <a:schemeClr val="tx1"/>
+            </a:fontRef>
+          </p:style>
+        </p:cxnSp>
+        <p:sp>
+          <p:nvSpPr>
+            <p:cNvPr id="87" name="TextBox 86">
+              <a:extLst>
+                <a:ext uri="{FF2B5EF4-FFF2-40B4-BE49-F238E27FC236}">
+                  <a16:creationId xmlns:a16="http://schemas.microsoft.com/office/drawing/2014/main" id="{09462406-0D0E-BC4B-8294-BE6277737B3B}"/>
+                </a:ext>
+              </a:extLst>
+            </p:cNvPr>
+            <p:cNvSpPr txBox="1"/>
+            <p:nvPr/>
+          </p:nvSpPr>
+          <p:spPr>
+            <a:xfrm>
+              <a:off x="5955579" y="962144"/>
+              <a:ext cx="301686" cy="369332"/>
+            </a:xfrm>
+            <a:prstGeom prst="rect">
+              <a:avLst/>
+            </a:prstGeom>
+            <a:noFill/>
+          </p:spPr>
+          <p:txBody>
+            <a:bodyPr wrap="square" rtlCol="0">
+              <a:spAutoFit/>
+            </a:bodyPr>
+            <a:lstStyle/>
+            <a:p>
+              <a:r>
+                <a:rPr lang="en-US" dirty="0">
+                  <a:solidFill>
+                    <a:srgbClr val="FF0000"/>
+                  </a:solidFill>
+                </a:rPr>
+                <a:t>1</a:t>
+              </a:r>
+            </a:p>
+          </p:txBody>
+        </p:sp>
+        <p:sp>
+          <p:nvSpPr>
+            <p:cNvPr id="88" name="TextBox 87">
+              <a:extLst>
+                <a:ext uri="{FF2B5EF4-FFF2-40B4-BE49-F238E27FC236}">
+                  <a16:creationId xmlns:a16="http://schemas.microsoft.com/office/drawing/2014/main" id="{A3D4CA25-38F8-8B4D-8B7B-A4C53EDCA2B4}"/>
+                </a:ext>
+              </a:extLst>
+            </p:cNvPr>
+            <p:cNvSpPr txBox="1"/>
+            <p:nvPr/>
+          </p:nvSpPr>
+          <p:spPr>
+            <a:xfrm>
+              <a:off x="7060563" y="3829273"/>
+              <a:ext cx="301686" cy="369332"/>
+            </a:xfrm>
+            <a:prstGeom prst="rect">
+              <a:avLst/>
+            </a:prstGeom>
+            <a:noFill/>
+          </p:spPr>
+          <p:txBody>
+            <a:bodyPr wrap="square" rtlCol="0">
+              <a:spAutoFit/>
+            </a:bodyPr>
+            <a:lstStyle/>
+            <a:p>
+              <a:r>
+                <a:rPr lang="en-US" dirty="0">
+                  <a:solidFill>
+                    <a:srgbClr val="FF0000"/>
+                  </a:solidFill>
+                </a:rPr>
+                <a:t>2</a:t>
+              </a:r>
+            </a:p>
+          </p:txBody>
+        </p:sp>
+        <p:sp>
+          <p:nvSpPr>
+            <p:cNvPr id="89" name="TextBox 88">
+              <a:extLst>
+                <a:ext uri="{FF2B5EF4-FFF2-40B4-BE49-F238E27FC236}">
+                  <a16:creationId xmlns:a16="http://schemas.microsoft.com/office/drawing/2014/main" id="{E735F5F5-5A85-5346-BF0D-C928E443D6C7}"/>
+                </a:ext>
+              </a:extLst>
+            </p:cNvPr>
+            <p:cNvSpPr txBox="1"/>
+            <p:nvPr/>
+          </p:nvSpPr>
+          <p:spPr>
+            <a:xfrm>
+              <a:off x="4881415" y="3017079"/>
+              <a:ext cx="289595" cy="369332"/>
+            </a:xfrm>
+            <a:prstGeom prst="rect">
+              <a:avLst/>
+            </a:prstGeom>
+            <a:noFill/>
+          </p:spPr>
+          <p:txBody>
+            <a:bodyPr wrap="square" rtlCol="0">
+              <a:spAutoFit/>
+            </a:bodyPr>
+            <a:lstStyle/>
+            <a:p>
+              <a:r>
+                <a:rPr lang="en-US" dirty="0">
+                  <a:solidFill>
+                    <a:srgbClr val="FF0000"/>
+                  </a:solidFill>
+                </a:rPr>
+                <a:t>3</a:t>
+              </a:r>
+            </a:p>
+          </p:txBody>
+        </p:sp>
+        <p:sp>
+          <p:nvSpPr>
+            <p:cNvPr id="90" name="TextBox 89">
+              <a:extLst>
+                <a:ext uri="{FF2B5EF4-FFF2-40B4-BE49-F238E27FC236}">
+                  <a16:creationId xmlns:a16="http://schemas.microsoft.com/office/drawing/2014/main" id="{2E33CE04-223A-1C46-A573-AA9CEB1006F5}"/>
+                </a:ext>
+              </a:extLst>
+            </p:cNvPr>
+            <p:cNvSpPr txBox="1"/>
+            <p:nvPr/>
+          </p:nvSpPr>
+          <p:spPr>
+            <a:xfrm>
+              <a:off x="5940680" y="3019961"/>
+              <a:ext cx="301686" cy="369332"/>
+            </a:xfrm>
+            <a:prstGeom prst="rect">
+              <a:avLst/>
+            </a:prstGeom>
+            <a:noFill/>
+          </p:spPr>
+          <p:txBody>
+            <a:bodyPr wrap="square" rtlCol="0">
+              <a:spAutoFit/>
+            </a:bodyPr>
+            <a:lstStyle/>
+            <a:p>
+              <a:r>
+                <a:rPr lang="en-US" dirty="0">
+                  <a:solidFill>
+                    <a:srgbClr val="FF0000"/>
+                  </a:solidFill>
+                </a:rPr>
+                <a:t>4</a:t>
+              </a:r>
+            </a:p>
+          </p:txBody>
+        </p:sp>
+        <p:sp>
+          <p:nvSpPr>
+            <p:cNvPr id="91" name="TextBox 90">
+              <a:extLst>
+                <a:ext uri="{FF2B5EF4-FFF2-40B4-BE49-F238E27FC236}">
+                  <a16:creationId xmlns:a16="http://schemas.microsoft.com/office/drawing/2014/main" id="{600DDBD6-3B48-AE4D-ADFD-BEBE10C526EB}"/>
+                </a:ext>
+              </a:extLst>
+            </p:cNvPr>
+            <p:cNvSpPr txBox="1"/>
+            <p:nvPr/>
+          </p:nvSpPr>
+          <p:spPr>
+            <a:xfrm>
+              <a:off x="6845770" y="2965314"/>
+              <a:ext cx="405305" cy="369332"/>
+            </a:xfrm>
+            <a:prstGeom prst="rect">
+              <a:avLst/>
+            </a:prstGeom>
+            <a:noFill/>
+          </p:spPr>
+          <p:txBody>
+            <a:bodyPr wrap="square" rtlCol="0">
+              <a:spAutoFit/>
+            </a:bodyPr>
+            <a:lstStyle/>
+            <a:p>
+              <a:r>
+                <a:rPr lang="en-US">
+                  <a:solidFill>
+                    <a:srgbClr val="FF0000"/>
+                  </a:solidFill>
+                </a:rPr>
+                <a:t>5</a:t>
+              </a:r>
+              <a:endParaRPr lang="en-US" dirty="0">
+                <a:solidFill>
+                  <a:srgbClr val="FF0000"/>
+                </a:solidFill>
+              </a:endParaRPr>
+            </a:p>
+          </p:txBody>
+        </p:sp>
+        <p:sp>
+          <p:nvSpPr>
+            <p:cNvPr id="92" name="TextBox 91">
+              <a:extLst>
+                <a:ext uri="{FF2B5EF4-FFF2-40B4-BE49-F238E27FC236}">
+                  <a16:creationId xmlns:a16="http://schemas.microsoft.com/office/drawing/2014/main" id="{74C7DFCE-ECE2-ED47-87DE-CA2A154D2121}"/>
+                </a:ext>
+              </a:extLst>
+            </p:cNvPr>
+            <p:cNvSpPr txBox="1"/>
+            <p:nvPr/>
+          </p:nvSpPr>
+          <p:spPr>
+            <a:xfrm>
+              <a:off x="5839710" y="2058316"/>
+              <a:ext cx="405305" cy="369332"/>
+            </a:xfrm>
+            <a:prstGeom prst="rect">
+              <a:avLst/>
+            </a:prstGeom>
+            <a:noFill/>
+          </p:spPr>
+          <p:txBody>
+            <a:bodyPr wrap="square" rtlCol="0">
+              <a:spAutoFit/>
+            </a:bodyPr>
+            <a:lstStyle/>
+            <a:p>
+              <a:r>
+                <a:rPr lang="en-US">
+                  <a:solidFill>
+                    <a:srgbClr val="FF0000"/>
+                  </a:solidFill>
+                </a:rPr>
+                <a:t>6</a:t>
+              </a:r>
+              <a:endParaRPr lang="en-US" dirty="0">
+                <a:solidFill>
+                  <a:srgbClr val="FF0000"/>
+                </a:solidFill>
+              </a:endParaRPr>
+            </a:p>
+          </p:txBody>
+        </p:sp>
+        <p:sp>
+          <p:nvSpPr>
+            <p:cNvPr id="93" name="TextBox 92">
+              <a:extLst>
+                <a:ext uri="{FF2B5EF4-FFF2-40B4-BE49-F238E27FC236}">
+                  <a16:creationId xmlns:a16="http://schemas.microsoft.com/office/drawing/2014/main" id="{A1ADBC54-87CA-DC41-9A95-A89890EFA512}"/>
+                </a:ext>
+              </a:extLst>
+            </p:cNvPr>
+            <p:cNvSpPr txBox="1"/>
+            <p:nvPr/>
+          </p:nvSpPr>
+          <p:spPr>
+            <a:xfrm>
+              <a:off x="6814971" y="1971254"/>
+              <a:ext cx="405305" cy="369332"/>
+            </a:xfrm>
+            <a:prstGeom prst="rect">
+              <a:avLst/>
+            </a:prstGeom>
+            <a:noFill/>
+          </p:spPr>
+          <p:txBody>
+            <a:bodyPr wrap="square" rtlCol="0">
+              <a:spAutoFit/>
+            </a:bodyPr>
+            <a:lstStyle/>
+            <a:p>
+              <a:r>
+                <a:rPr lang="en-US" dirty="0">
+                  <a:solidFill>
+                    <a:srgbClr val="FF0000"/>
+                  </a:solidFill>
+                </a:rPr>
+                <a:t>7</a:t>
+              </a:r>
+            </a:p>
+          </p:txBody>
+        </p:sp>
+        <p:sp>
+          <p:nvSpPr>
+            <p:cNvPr id="94" name="Rectangle 93">
+              <a:extLst>
+                <a:ext uri="{FF2B5EF4-FFF2-40B4-BE49-F238E27FC236}">
+                  <a16:creationId xmlns:a16="http://schemas.microsoft.com/office/drawing/2014/main" id="{750FAB20-6DD0-6E4C-BA42-958C6BDC8D50}"/>
+                </a:ext>
+              </a:extLst>
+            </p:cNvPr>
+            <p:cNvSpPr/>
+            <p:nvPr/>
+          </p:nvSpPr>
+          <p:spPr>
+            <a:xfrm>
+              <a:off x="5324886" y="3397225"/>
+              <a:ext cx="432048" cy="432048"/>
+            </a:xfrm>
+            <a:prstGeom prst="rect">
+              <a:avLst/>
+            </a:prstGeom>
+            <a:solidFill>
+              <a:schemeClr val="bg1"/>
+            </a:solidFill>
+            <a:ln w="28575">
+              <a:solidFill>
+                <a:schemeClr val="tx1"/>
+              </a:solidFill>
+            </a:ln>
+          </p:spPr>
+          <p:style>
+            <a:lnRef idx="2">
+              <a:schemeClr val="accent1">
+                <a:shade val="50000"/>
+              </a:schemeClr>
+            </a:lnRef>
+            <a:fillRef idx="1">
+              <a:schemeClr val="accent1"/>
+            </a:fillRef>
+            <a:effectRef idx="0">
+              <a:schemeClr val="accent1"/>
+            </a:effectRef>
+            <a:fontRef idx="minor">
+              <a:schemeClr val="lt1"/>
+            </a:fontRef>
+          </p:style>
+          <p:txBody>
+            <a:bodyPr rtlCol="0" anchor="ctr"/>
+            <a:lstStyle/>
+            <a:p>
+              <a:pPr algn="ctr"/>
+              <a:endParaRPr lang="en-US" dirty="0"/>
+            </a:p>
+          </p:txBody>
+        </p:sp>
+        <p:cxnSp>
+          <p:nvCxnSpPr>
+            <p:cNvPr id="95" name="Straight Connector 94">
+              <a:extLst>
+                <a:ext uri="{FF2B5EF4-FFF2-40B4-BE49-F238E27FC236}">
+                  <a16:creationId xmlns:a16="http://schemas.microsoft.com/office/drawing/2014/main" id="{02F87328-47C1-764B-8F95-C40928536BF5}"/>
+                </a:ext>
+              </a:extLst>
+            </p:cNvPr>
+            <p:cNvCxnSpPr>
+              <a:cxnSpLocks/>
+            </p:cNvCxnSpPr>
+            <p:nvPr/>
+          </p:nvCxnSpPr>
+          <p:spPr>
+            <a:xfrm>
+              <a:off x="4727540" y="3622126"/>
+              <a:ext cx="597346" cy="0"/>
+            </a:xfrm>
+            <a:prstGeom prst="line">
+              <a:avLst/>
+            </a:prstGeom>
+            <a:ln w="28575">
+              <a:solidFill>
+                <a:schemeClr val="tx1"/>
+              </a:solidFill>
+            </a:ln>
+          </p:spPr>
+          <p:style>
+            <a:lnRef idx="1">
+              <a:schemeClr val="accent1"/>
+            </a:lnRef>
+            <a:fillRef idx="0">
+              <a:schemeClr val="accent1"/>
+            </a:fillRef>
+            <a:effectRef idx="0">
+              <a:schemeClr val="accent1"/>
+            </a:effectRef>
+            <a:fontRef idx="minor">
+              <a:schemeClr val="tx1"/>
+            </a:fontRef>
+          </p:style>
+        </p:cxnSp>
+        <mc:AlternateContent xmlns:mc="http://schemas.openxmlformats.org/markup-compatibility/2006">
+          <mc:Choice xmlns:a14="http://schemas.microsoft.com/office/drawing/2010/main" Requires="a14">
+            <p:sp>
+              <p:nvSpPr>
+                <p:cNvPr id="96" name="Rectangle 95">
+                  <a:extLst>
+                    <a:ext uri="{FF2B5EF4-FFF2-40B4-BE49-F238E27FC236}">
+                      <a16:creationId xmlns:a16="http://schemas.microsoft.com/office/drawing/2014/main" id="{CF6F26DD-0C24-F847-A1FC-B4D9CDCB3238}"/>
+                    </a:ext>
+                  </a:extLst>
+                </p:cNvPr>
+                <p:cNvSpPr/>
+                <p:nvPr/>
+              </p:nvSpPr>
+              <p:spPr>
+                <a:xfrm>
+                  <a:off x="5887185" y="3567796"/>
+                  <a:ext cx="350673" cy="369332"/>
+                </a:xfrm>
+                <a:prstGeom prst="rect">
+                  <a:avLst/>
+                </a:prstGeom>
+                <a:ln>
+                  <a:noFill/>
+                </a:ln>
+              </p:spPr>
+              <p:txBody>
+                <a:bodyPr wrap="square">
+                  <a:spAutoFit/>
+                </a:bodyPr>
+                <a:lstStyle/>
+                <a:p>
+                  <a:pPr/>
+                  <a14:m>
+                    <m:oMathPara xmlns:m="http://schemas.openxmlformats.org/officeDocument/2006/math">
+                      <m:oMathParaPr>
+                        <m:jc m:val="centerGroup"/>
+                      </m:oMathParaPr>
+                      <m:oMath xmlns:m="http://schemas.openxmlformats.org/officeDocument/2006/math">
+                        <m:r>
+                          <a:rPr lang="en-US" b="0" i="1" smtClean="0">
+                            <a:latin typeface="Cambria Math" charset="0"/>
+                            <a:ea typeface="Cambria Math" charset="0"/>
+                            <a:cs typeface="Cambria Math" charset="0"/>
+                          </a:rPr>
+                          <m:t>𝜀</m:t>
+                        </m:r>
+                      </m:oMath>
+                    </m:oMathPara>
+                  </a14:m>
+                  <a:endParaRPr lang="en-US" dirty="0"/>
+                </a:p>
+              </p:txBody>
+            </p:sp>
+          </mc:Choice>
+          <mc:Fallback>
+            <p:sp>
+              <p:nvSpPr>
+                <p:cNvPr id="96" name="Rectangle 95">
+                  <a:extLst>
+                    <a:ext uri="{FF2B5EF4-FFF2-40B4-BE49-F238E27FC236}">
+                      <a16:creationId xmlns:a16="http://schemas.microsoft.com/office/drawing/2014/main" id="{CF6F26DD-0C24-F847-A1FC-B4D9CDCB3238}"/>
+                    </a:ext>
+                  </a:extLst>
+                </p:cNvPr>
+                <p:cNvSpPr>
+                  <a:spLocks noRot="1" noChangeAspect="1" noMove="1" noResize="1" noEditPoints="1" noAdjustHandles="1" noChangeArrowheads="1" noChangeShapeType="1" noTextEdit="1"/>
+                </p:cNvSpPr>
+                <p:nvPr/>
+              </p:nvSpPr>
+              <p:spPr>
+                <a:xfrm>
+                  <a:off x="5887185" y="3567796"/>
+                  <a:ext cx="350673" cy="369332"/>
+                </a:xfrm>
+                <a:prstGeom prst="rect">
+                  <a:avLst/>
+                </a:prstGeom>
+                <a:blipFill>
+                  <a:blip r:embed="rId14"/>
+                  <a:stretch>
+                    <a:fillRect/>
+                  </a:stretch>
+                </a:blipFill>
+                <a:ln>
+                  <a:noFill/>
+                </a:ln>
+              </p:spPr>
+              <p:txBody>
+                <a:bodyPr/>
+                <a:lstStyle/>
+                <a:p>
+                  <a:r>
+                    <a:rPr lang="en-US">
+                      <a:noFill/>
+                    </a:rPr>
+                    <a:t> </a:t>
+                  </a:r>
+                </a:p>
+              </p:txBody>
+            </p:sp>
+          </mc:Fallback>
+        </mc:AlternateContent>
+        <mc:AlternateContent xmlns:mc="http://schemas.openxmlformats.org/markup-compatibility/2006">
+          <mc:Choice xmlns:a14="http://schemas.microsoft.com/office/drawing/2010/main" Requires="a14">
+            <p:sp>
+              <p:nvSpPr>
+                <p:cNvPr id="97" name="Rectangle 96">
+                  <a:extLst>
+                    <a:ext uri="{FF2B5EF4-FFF2-40B4-BE49-F238E27FC236}">
+                      <a16:creationId xmlns:a16="http://schemas.microsoft.com/office/drawing/2014/main" id="{AE13930C-A098-F842-B058-0BDD27EA9C18}"/>
+                    </a:ext>
+                  </a:extLst>
+                </p:cNvPr>
+                <p:cNvSpPr/>
+                <p:nvPr/>
+              </p:nvSpPr>
+              <p:spPr>
+                <a:xfrm>
+                  <a:off x="5348018" y="3437460"/>
+                  <a:ext cx="414216" cy="369332"/>
+                </a:xfrm>
+                <a:prstGeom prst="rect">
+                  <a:avLst/>
+                </a:prstGeom>
+                <a:ln>
+                  <a:noFill/>
+                </a:ln>
+              </p:spPr>
+              <p:txBody>
+                <a:bodyPr wrap="square">
+                  <a:spAutoFit/>
+                </a:bodyPr>
+                <a:lstStyle/>
+                <a:p>
+                  <a:pPr/>
+                  <a14:m>
+                    <m:oMathPara xmlns:m="http://schemas.openxmlformats.org/officeDocument/2006/math">
+                      <m:oMathParaPr>
+                        <m:jc m:val="centerGroup"/>
+                      </m:oMathParaPr>
+                      <m:oMath xmlns:m="http://schemas.openxmlformats.org/officeDocument/2006/math">
+                        <m:r>
+                          <a:rPr lang="en-US" b="0" i="1" smtClean="0">
+                            <a:latin typeface="Cambria Math" charset="0"/>
+                          </a:rPr>
+                          <m:t>𝑁</m:t>
+                        </m:r>
+                      </m:oMath>
+                    </m:oMathPara>
+                  </a14:m>
+                  <a:endParaRPr lang="en-US" dirty="0"/>
+                </a:p>
+              </p:txBody>
+            </p:sp>
+          </mc:Choice>
+          <mc:Fallback>
+            <p:sp>
+              <p:nvSpPr>
+                <p:cNvPr id="97" name="Rectangle 96">
+                  <a:extLst>
+                    <a:ext uri="{FF2B5EF4-FFF2-40B4-BE49-F238E27FC236}">
+                      <a16:creationId xmlns:a16="http://schemas.microsoft.com/office/drawing/2014/main" id="{AE13930C-A098-F842-B058-0BDD27EA9C18}"/>
+                    </a:ext>
+                  </a:extLst>
+                </p:cNvPr>
+                <p:cNvSpPr>
+                  <a:spLocks noRot="1" noChangeAspect="1" noMove="1" noResize="1" noEditPoints="1" noAdjustHandles="1" noChangeArrowheads="1" noChangeShapeType="1" noTextEdit="1"/>
+                </p:cNvSpPr>
+                <p:nvPr/>
+              </p:nvSpPr>
+              <p:spPr>
+                <a:xfrm>
+                  <a:off x="5348018" y="3437460"/>
+                  <a:ext cx="414216" cy="369332"/>
+                </a:xfrm>
+                <a:prstGeom prst="rect">
+                  <a:avLst/>
+                </a:prstGeom>
+                <a:blipFill>
+                  <a:blip r:embed="rId15"/>
+                  <a:stretch>
+                    <a:fillRect/>
+                  </a:stretch>
+                </a:blipFill>
+                <a:ln>
+                  <a:noFill/>
+                </a:ln>
+              </p:spPr>
+              <p:txBody>
+                <a:bodyPr/>
+                <a:lstStyle/>
+                <a:p>
+                  <a:r>
+                    <a:rPr lang="en-US">
+                      <a:noFill/>
+                    </a:rPr>
+                    <a:t> </a:t>
+                  </a:r>
+                </a:p>
+              </p:txBody>
+            </p:sp>
+          </mc:Fallback>
+        </mc:AlternateContent>
+        <p:cxnSp>
+          <p:nvCxnSpPr>
+            <p:cNvPr id="98" name="Straight Arrow Connector 97">
+              <a:extLst>
+                <a:ext uri="{FF2B5EF4-FFF2-40B4-BE49-F238E27FC236}">
+                  <a16:creationId xmlns:a16="http://schemas.microsoft.com/office/drawing/2014/main" id="{357FCACA-3B82-DB41-B7E3-89D4A74DEED4}"/>
+                </a:ext>
+              </a:extLst>
+            </p:cNvPr>
+            <p:cNvCxnSpPr>
+              <a:cxnSpLocks/>
+            </p:cNvCxnSpPr>
+            <p:nvPr/>
+          </p:nvCxnSpPr>
+          <p:spPr>
+            <a:xfrm>
+              <a:off x="4833841" y="3390850"/>
+              <a:ext cx="384744" cy="0"/>
+            </a:xfrm>
+            <a:prstGeom prst="straightConnector1">
+              <a:avLst/>
+            </a:prstGeom>
+            <a:ln w="28575">
+              <a:solidFill>
+                <a:srgbClr val="FF0000"/>
+              </a:solidFill>
+              <a:tailEnd type="arrow"/>
+            </a:ln>
+          </p:spPr>
+          <p:style>
+            <a:lnRef idx="1">
+              <a:schemeClr val="accent1"/>
+            </a:lnRef>
+            <a:fillRef idx="0">
+              <a:schemeClr val="accent1"/>
+            </a:fillRef>
+            <a:effectRef idx="0">
+              <a:schemeClr val="accent1"/>
+            </a:effectRef>
+            <a:fontRef idx="minor">
+              <a:schemeClr val="tx1"/>
+            </a:fontRef>
+          </p:style>
+        </p:cxnSp>
+        <p:sp>
+          <p:nvSpPr>
+            <p:cNvPr id="99" name="TextBox 98">
+              <a:extLst>
+                <a:ext uri="{FF2B5EF4-FFF2-40B4-BE49-F238E27FC236}">
+                  <a16:creationId xmlns:a16="http://schemas.microsoft.com/office/drawing/2014/main" id="{D7D37801-E179-AD40-AC12-F19F78A0E56E}"/>
+                </a:ext>
+              </a:extLst>
+            </p:cNvPr>
+            <p:cNvSpPr txBox="1"/>
+            <p:nvPr/>
+          </p:nvSpPr>
+          <p:spPr>
+            <a:xfrm>
+              <a:off x="6978369" y="1088258"/>
+              <a:ext cx="405305" cy="369332"/>
+            </a:xfrm>
+            <a:prstGeom prst="rect">
+              <a:avLst/>
+            </a:prstGeom>
+            <a:noFill/>
+          </p:spPr>
+          <p:txBody>
+            <a:bodyPr wrap="square" rtlCol="0">
+              <a:spAutoFit/>
+            </a:bodyPr>
+            <a:lstStyle/>
+            <a:p>
+              <a:r>
+                <a:rPr lang="en-US" dirty="0">
+                  <a:solidFill>
+                    <a:srgbClr val="FF0000"/>
+                  </a:solidFill>
+                </a:rPr>
+                <a:t>8</a:t>
+              </a:r>
+            </a:p>
+          </p:txBody>
+        </p:sp>
+        <p:sp>
+          <p:nvSpPr>
+            <p:cNvPr id="100" name="TextBox 99">
+              <a:extLst>
+                <a:ext uri="{FF2B5EF4-FFF2-40B4-BE49-F238E27FC236}">
+                  <a16:creationId xmlns:a16="http://schemas.microsoft.com/office/drawing/2014/main" id="{CDC6A071-12AB-1349-A5F9-924B6D13C701}"/>
+                </a:ext>
+              </a:extLst>
+            </p:cNvPr>
+            <p:cNvSpPr txBox="1"/>
+            <p:nvPr/>
+          </p:nvSpPr>
+          <p:spPr>
+            <a:xfrm>
+              <a:off x="6415660" y="3374868"/>
+              <a:ext cx="432048" cy="461665"/>
+            </a:xfrm>
+            <a:prstGeom prst="rect">
+              <a:avLst/>
+            </a:prstGeom>
+            <a:noFill/>
+            <a:ln>
+              <a:noFill/>
+            </a:ln>
+          </p:spPr>
+          <p:txBody>
+            <a:bodyPr wrap="square" rtlCol="0">
+              <a:spAutoFit/>
+            </a:bodyPr>
+            <a:lstStyle/>
+            <a:p>
+              <a:r>
+                <a:rPr lang="en-US" sz="2400"/>
                 <a:t>+</a:t>
               </a:r>
               <a:endParaRPr lang="en-US" sz="2400" dirty="0"/>

</xml_diff>

<commit_message>
minor updates FFG lesson
</commit_message>
<xml_diff>
--- a/lessons/notebooks/figures/ffg-bayesian-linear-regression.pptx
+++ b/lessons/notebooks/figures/ffg-bayesian-linear-regression.pptx
@@ -241,7 +241,7 @@
           <a:p>
             <a:fld id="{7DE29A69-406D-DD45-9AA5-47300041E804}" type="datetimeFigureOut">
               <a:rPr lang="en-US" smtClean="0"/>
-              <a:t>1/1/20</a:t>
+              <a:t>11/30/22</a:t>
             </a:fld>
             <a:endParaRPr lang="en-US"/>
           </a:p>
@@ -409,7 +409,7 @@
           <a:p>
             <a:fld id="{7DE29A69-406D-DD45-9AA5-47300041E804}" type="datetimeFigureOut">
               <a:rPr lang="en-US" smtClean="0"/>
-              <a:t>1/1/20</a:t>
+              <a:t>11/30/22</a:t>
             </a:fld>
             <a:endParaRPr lang="en-US"/>
           </a:p>
@@ -587,7 +587,7 @@
           <a:p>
             <a:fld id="{7DE29A69-406D-DD45-9AA5-47300041E804}" type="datetimeFigureOut">
               <a:rPr lang="en-US" smtClean="0"/>
-              <a:t>1/1/20</a:t>
+              <a:t>11/30/22</a:t>
             </a:fld>
             <a:endParaRPr lang="en-US"/>
           </a:p>
@@ -755,7 +755,7 @@
           <a:p>
             <a:fld id="{7DE29A69-406D-DD45-9AA5-47300041E804}" type="datetimeFigureOut">
               <a:rPr lang="en-US" smtClean="0"/>
-              <a:t>1/1/20</a:t>
+              <a:t>11/30/22</a:t>
             </a:fld>
             <a:endParaRPr lang="en-US"/>
           </a:p>
@@ -1000,7 +1000,7 @@
           <a:p>
             <a:fld id="{7DE29A69-406D-DD45-9AA5-47300041E804}" type="datetimeFigureOut">
               <a:rPr lang="en-US" smtClean="0"/>
-              <a:t>1/1/20</a:t>
+              <a:t>11/30/22</a:t>
             </a:fld>
             <a:endParaRPr lang="en-US"/>
           </a:p>
@@ -1229,7 +1229,7 @@
           <a:p>
             <a:fld id="{7DE29A69-406D-DD45-9AA5-47300041E804}" type="datetimeFigureOut">
               <a:rPr lang="en-US" smtClean="0"/>
-              <a:t>1/1/20</a:t>
+              <a:t>11/30/22</a:t>
             </a:fld>
             <a:endParaRPr lang="en-US"/>
           </a:p>
@@ -1593,7 +1593,7 @@
           <a:p>
             <a:fld id="{7DE29A69-406D-DD45-9AA5-47300041E804}" type="datetimeFigureOut">
               <a:rPr lang="en-US" smtClean="0"/>
-              <a:t>1/1/20</a:t>
+              <a:t>11/30/22</a:t>
             </a:fld>
             <a:endParaRPr lang="en-US"/>
           </a:p>
@@ -1710,7 +1710,7 @@
           <a:p>
             <a:fld id="{7DE29A69-406D-DD45-9AA5-47300041E804}" type="datetimeFigureOut">
               <a:rPr lang="en-US" smtClean="0"/>
-              <a:t>1/1/20</a:t>
+              <a:t>11/30/22</a:t>
             </a:fld>
             <a:endParaRPr lang="en-US"/>
           </a:p>
@@ -1805,7 +1805,7 @@
           <a:p>
             <a:fld id="{7DE29A69-406D-DD45-9AA5-47300041E804}" type="datetimeFigureOut">
               <a:rPr lang="en-US" smtClean="0"/>
-              <a:t>1/1/20</a:t>
+              <a:t>11/30/22</a:t>
             </a:fld>
             <a:endParaRPr lang="en-US"/>
           </a:p>
@@ -2080,7 +2080,7 @@
           <a:p>
             <a:fld id="{7DE29A69-406D-DD45-9AA5-47300041E804}" type="datetimeFigureOut">
               <a:rPr lang="en-US" smtClean="0"/>
-              <a:t>1/1/20</a:t>
+              <a:t>11/30/22</a:t>
             </a:fld>
             <a:endParaRPr lang="en-US"/>
           </a:p>
@@ -2332,7 +2332,7 @@
           <a:p>
             <a:fld id="{7DE29A69-406D-DD45-9AA5-47300041E804}" type="datetimeFigureOut">
               <a:rPr lang="en-US" smtClean="0"/>
-              <a:t>1/1/20</a:t>
+              <a:t>11/30/22</a:t>
             </a:fld>
             <a:endParaRPr lang="en-US"/>
           </a:p>
@@ -2543,7 +2543,7 @@
           <a:p>
             <a:fld id="{7DE29A69-406D-DD45-9AA5-47300041E804}" type="datetimeFigureOut">
               <a:rPr lang="en-US" smtClean="0"/>
-              <a:t>1/1/20</a:t>
+              <a:t>11/30/22</a:t>
             </a:fld>
             <a:endParaRPr lang="en-US"/>
           </a:p>
@@ -3016,8 +3016,8 @@
             </a:p>
           </p:txBody>
         </p:sp>
-        <mc:AlternateContent xmlns:mc="http://schemas.openxmlformats.org/markup-compatibility/2006">
-          <mc:Choice xmlns:a14="http://schemas.microsoft.com/office/drawing/2010/main" Requires="a14">
+        <mc:AlternateContent xmlns:mc="http://schemas.openxmlformats.org/markup-compatibility/2006" xmlns:a14="http://schemas.microsoft.com/office/drawing/2010/main">
+          <mc:Choice Requires="a14">
             <p:sp>
               <p:nvSpPr>
                 <p:cNvPr id="5" name="Rectangle 4"/>
@@ -3078,7 +3078,7 @@
               </p:txBody>
             </p:sp>
           </mc:Choice>
-          <mc:Fallback>
+          <mc:Fallback xmlns="">
             <p:sp>
               <p:nvSpPr>
                 <p:cNvPr id="5" name="Rectangle 4"/>
@@ -3215,6 +3215,8 @@
               <a:solidFill>
                 <a:schemeClr val="tx1"/>
               </a:solidFill>
+              <a:headEnd type="none" w="med" len="med"/>
+              <a:tailEnd type="arrow" w="med" len="med"/>
             </a:ln>
           </p:spPr>
           <p:style>
@@ -3250,6 +3252,8 @@
               <a:solidFill>
                 <a:schemeClr val="tx1"/>
               </a:solidFill>
+              <a:headEnd type="none" w="med" len="med"/>
+              <a:tailEnd type="arrow" w="med" len="med"/>
             </a:ln>
           </p:spPr>
           <p:style>
@@ -3315,8 +3319,8 @@
             </a:p>
           </p:txBody>
         </p:sp>
-        <mc:AlternateContent xmlns:mc="http://schemas.openxmlformats.org/markup-compatibility/2006">
-          <mc:Choice xmlns:a14="http://schemas.microsoft.com/office/drawing/2010/main" Requires="a14">
+        <mc:AlternateContent xmlns:mc="http://schemas.openxmlformats.org/markup-compatibility/2006" xmlns:a14="http://schemas.microsoft.com/office/drawing/2010/main">
+          <mc:Choice Requires="a14">
             <p:sp>
               <p:nvSpPr>
                 <p:cNvPr id="14" name="Rectangle 13"/>
@@ -3359,7 +3363,7 @@
               </p:txBody>
             </p:sp>
           </mc:Choice>
-          <mc:Fallback>
+          <mc:Fallback xmlns="">
             <p:sp>
               <p:nvSpPr>
                 <p:cNvPr id="14" name="Rectangle 13"/>
@@ -3419,6 +3423,8 @@
               <a:solidFill>
                 <a:schemeClr val="tx1"/>
               </a:solidFill>
+              <a:headEnd type="none" w="med" len="med"/>
+              <a:tailEnd type="arrow" w="med" len="med"/>
             </a:ln>
           </p:spPr>
           <p:style>
@@ -3454,6 +3460,8 @@
               <a:solidFill>
                 <a:schemeClr val="tx1"/>
               </a:solidFill>
+              <a:headEnd type="none" w="med" len="med"/>
+              <a:tailEnd type="arrow" w="med" len="med"/>
             </a:ln>
           </p:spPr>
           <p:style>
@@ -3537,6 +3545,8 @@
               <a:solidFill>
                 <a:schemeClr val="tx1"/>
               </a:solidFill>
+              <a:headEnd type="none" w="med" len="med"/>
+              <a:tailEnd type="arrow" w="med" len="med"/>
             </a:ln>
           </p:spPr>
           <p:style>
@@ -3572,6 +3582,8 @@
               <a:solidFill>
                 <a:schemeClr val="tx1"/>
               </a:solidFill>
+              <a:headEnd type="none" w="med" len="med"/>
+              <a:tailEnd type="arrow" w="med" len="med"/>
             </a:ln>
           </p:spPr>
           <p:style>
@@ -3634,8 +3646,8 @@
             </a:p>
           </p:txBody>
         </p:sp>
-        <mc:AlternateContent xmlns:mc="http://schemas.openxmlformats.org/markup-compatibility/2006">
-          <mc:Choice xmlns:a14="http://schemas.microsoft.com/office/drawing/2010/main" Requires="a14">
+        <mc:AlternateContent xmlns:mc="http://schemas.openxmlformats.org/markup-compatibility/2006" xmlns:a14="http://schemas.microsoft.com/office/drawing/2010/main">
+          <mc:Choice Requires="a14">
             <p:sp>
               <p:nvSpPr>
                 <p:cNvPr id="27" name="Rectangle 26"/>
@@ -3681,7 +3693,7 @@
               </p:txBody>
             </p:sp>
           </mc:Choice>
-          <mc:Fallback>
+          <mc:Fallback xmlns="">
             <p:sp>
               <p:nvSpPr>
                 <p:cNvPr id="27" name="Rectangle 26"/>
@@ -3741,6 +3753,8 @@
               <a:solidFill>
                 <a:schemeClr val="tx1"/>
               </a:solidFill>
+              <a:headEnd type="none" w="med" len="med"/>
+              <a:tailEnd type="arrow" w="med" len="med"/>
             </a:ln>
           </p:spPr>
           <p:style>
@@ -3758,8 +3772,8 @@
             </a:fontRef>
           </p:style>
         </p:cxnSp>
-        <mc:AlternateContent xmlns:mc="http://schemas.openxmlformats.org/markup-compatibility/2006">
-          <mc:Choice xmlns:a14="http://schemas.microsoft.com/office/drawing/2010/main" Requires="a14">
+        <mc:AlternateContent xmlns:mc="http://schemas.openxmlformats.org/markup-compatibility/2006" xmlns:a14="http://schemas.microsoft.com/office/drawing/2010/main">
+          <mc:Choice Requires="a14">
             <p:sp>
               <p:nvSpPr>
                 <p:cNvPr id="32" name="Rectangle 31"/>
@@ -3805,7 +3819,7 @@
               </p:txBody>
             </p:sp>
           </mc:Choice>
-          <mc:Fallback>
+          <mc:Fallback xmlns="">
             <p:sp>
               <p:nvSpPr>
                 <p:cNvPr id="32" name="Rectangle 31"/>
@@ -3847,8 +3861,8 @@
             </p:sp>
           </mc:Fallback>
         </mc:AlternateContent>
-        <mc:AlternateContent xmlns:mc="http://schemas.openxmlformats.org/markup-compatibility/2006">
-          <mc:Choice xmlns:a14="http://schemas.microsoft.com/office/drawing/2010/main" Requires="a14">
+        <mc:AlternateContent xmlns:mc="http://schemas.openxmlformats.org/markup-compatibility/2006" xmlns:a14="http://schemas.microsoft.com/office/drawing/2010/main">
+          <mc:Choice Requires="a14">
             <p:sp>
               <p:nvSpPr>
                 <p:cNvPr id="33" name="Rectangle 32"/>
@@ -3915,7 +3929,7 @@
               </p:txBody>
             </p:sp>
           </mc:Choice>
-          <mc:Fallback>
+          <mc:Fallback xmlns="">
             <p:sp>
               <p:nvSpPr>
                 <p:cNvPr id="33" name="Rectangle 32"/>
@@ -4023,6 +4037,8 @@
               <a:solidFill>
                 <a:schemeClr val="tx1"/>
               </a:solidFill>
+              <a:headEnd type="none" w="med" len="med"/>
+              <a:tailEnd type="arrow" w="med" len="med"/>
             </a:ln>
           </p:spPr>
           <p:style>
@@ -4040,8 +4056,8 @@
             </a:fontRef>
           </p:style>
         </p:cxnSp>
-        <mc:AlternateContent xmlns:mc="http://schemas.openxmlformats.org/markup-compatibility/2006">
-          <mc:Choice xmlns:a14="http://schemas.microsoft.com/office/drawing/2010/main" Requires="a14">
+        <mc:AlternateContent xmlns:mc="http://schemas.openxmlformats.org/markup-compatibility/2006" xmlns:a14="http://schemas.microsoft.com/office/drawing/2010/main">
+          <mc:Choice Requires="a14">
             <p:sp>
               <p:nvSpPr>
                 <p:cNvPr id="63" name="Rectangle 62"/>
@@ -4089,7 +4105,7 @@
               </p:txBody>
             </p:sp>
           </mc:Choice>
-          <mc:Fallback>
+          <mc:Fallback xmlns="">
             <p:sp>
               <p:nvSpPr>
                 <p:cNvPr id="63" name="Rectangle 62"/>
@@ -4131,8 +4147,8 @@
             </p:sp>
           </mc:Fallback>
         </mc:AlternateContent>
-        <mc:AlternateContent xmlns:mc="http://schemas.openxmlformats.org/markup-compatibility/2006">
-          <mc:Choice xmlns:a14="http://schemas.microsoft.com/office/drawing/2010/main" Requires="a14">
+        <mc:AlternateContent xmlns:mc="http://schemas.openxmlformats.org/markup-compatibility/2006" xmlns:a14="http://schemas.microsoft.com/office/drawing/2010/main">
+          <mc:Choice Requires="a14">
             <p:sp>
               <p:nvSpPr>
                 <p:cNvPr id="26" name="Rectangle 25"/>
@@ -4178,7 +4194,7 @@
               </p:txBody>
             </p:sp>
           </mc:Choice>
-          <mc:Fallback>
+          <mc:Fallback xmlns="">
             <p:sp>
               <p:nvSpPr>
                 <p:cNvPr id="26" name="Rectangle 25"/>
@@ -4307,8 +4323,8 @@
             </a:p>
           </p:txBody>
         </p:sp>
-        <mc:AlternateContent xmlns:mc="http://schemas.openxmlformats.org/markup-compatibility/2006">
-          <mc:Choice xmlns:a14="http://schemas.microsoft.com/office/drawing/2010/main" Requires="a14">
+        <mc:AlternateContent xmlns:mc="http://schemas.openxmlformats.org/markup-compatibility/2006" xmlns:a14="http://schemas.microsoft.com/office/drawing/2010/main">
+          <mc:Choice Requires="a14">
             <p:sp>
               <p:nvSpPr>
                 <p:cNvPr id="47" name="Rectangle 46">
@@ -4375,7 +4391,7 @@
               </p:txBody>
             </p:sp>
           </mc:Choice>
-          <mc:Fallback>
+          <mc:Fallback xmlns="">
             <p:sp>
               <p:nvSpPr>
                 <p:cNvPr id="47" name="Rectangle 46">
@@ -4538,6 +4554,8 @@
               <a:solidFill>
                 <a:schemeClr val="tx1"/>
               </a:solidFill>
+              <a:headEnd type="none" w="med" len="med"/>
+              <a:tailEnd type="arrow" w="med" len="med"/>
             </a:ln>
           </p:spPr>
           <p:style>
@@ -4581,6 +4599,8 @@
               <a:solidFill>
                 <a:schemeClr val="tx1"/>
               </a:solidFill>
+              <a:headEnd type="none" w="med" len="med"/>
+              <a:tailEnd type="arrow" w="med" len="med"/>
             </a:ln>
           </p:spPr>
           <p:style>
@@ -4652,8 +4672,8 @@
             </a:p>
           </p:txBody>
         </p:sp>
-        <mc:AlternateContent xmlns:mc="http://schemas.openxmlformats.org/markup-compatibility/2006">
-          <mc:Choice xmlns:a14="http://schemas.microsoft.com/office/drawing/2010/main" Requires="a14">
+        <mc:AlternateContent xmlns:mc="http://schemas.openxmlformats.org/markup-compatibility/2006" xmlns:a14="http://schemas.microsoft.com/office/drawing/2010/main">
+          <mc:Choice Requires="a14">
             <p:sp>
               <p:nvSpPr>
                 <p:cNvPr id="56" name="Rectangle 55">
@@ -4702,7 +4722,7 @@
               </p:txBody>
             </p:sp>
           </mc:Choice>
-          <mc:Fallback>
+          <mc:Fallback xmlns="">
             <p:sp>
               <p:nvSpPr>
                 <p:cNvPr id="56" name="Rectangle 55">
@@ -4828,6 +4848,8 @@
               <a:solidFill>
                 <a:schemeClr val="tx1"/>
               </a:solidFill>
+              <a:headEnd type="none" w="med" len="med"/>
+              <a:tailEnd type="arrow" w="med" len="med"/>
             </a:ln>
           </p:spPr>
           <p:style>
@@ -4871,6 +4893,8 @@
               <a:solidFill>
                 <a:schemeClr val="tx1"/>
               </a:solidFill>
+              <a:headEnd type="none" w="med" len="med"/>
+              <a:tailEnd type="arrow" w="med" len="med"/>
             </a:ln>
           </p:spPr>
           <p:style>
@@ -4968,6 +4992,8 @@
               <a:solidFill>
                 <a:schemeClr val="tx1"/>
               </a:solidFill>
+              <a:headEnd type="none" w="med" len="med"/>
+              <a:tailEnd type="arrow" w="med" len="med"/>
             </a:ln>
           </p:spPr>
           <p:style>
@@ -5011,6 +5037,8 @@
               <a:solidFill>
                 <a:schemeClr val="tx1"/>
               </a:solidFill>
+              <a:headEnd type="none" w="med" len="med"/>
+              <a:tailEnd type="arrow" w="med" len="med"/>
             </a:ln>
           </p:spPr>
           <p:style>
@@ -5133,8 +5161,8 @@
             </a:p>
           </p:txBody>
         </p:sp>
-        <mc:AlternateContent xmlns:mc="http://schemas.openxmlformats.org/markup-compatibility/2006">
-          <mc:Choice xmlns:a14="http://schemas.microsoft.com/office/drawing/2010/main" Requires="a14">
+        <mc:AlternateContent xmlns:mc="http://schemas.openxmlformats.org/markup-compatibility/2006" xmlns:a14="http://schemas.microsoft.com/office/drawing/2010/main">
+          <mc:Choice Requires="a14">
             <p:sp>
               <p:nvSpPr>
                 <p:cNvPr id="75" name="Rectangle 74">
@@ -5186,7 +5214,7 @@
               </p:txBody>
             </p:sp>
           </mc:Choice>
-          <mc:Fallback>
+          <mc:Fallback xmlns="">
             <p:sp>
               <p:nvSpPr>
                 <p:cNvPr id="75" name="Rectangle 74">
@@ -5260,6 +5288,8 @@
               <a:solidFill>
                 <a:schemeClr val="tx1"/>
               </a:solidFill>
+              <a:headEnd type="none" w="med" len="med"/>
+              <a:tailEnd type="arrow" w="med" len="med"/>
             </a:ln>
           </p:spPr>
           <p:style>
@@ -5331,8 +5361,8 @@
             </a:p>
           </p:txBody>
         </p:sp>
-        <mc:AlternateContent xmlns:mc="http://schemas.openxmlformats.org/markup-compatibility/2006">
-          <mc:Choice xmlns:a14="http://schemas.microsoft.com/office/drawing/2010/main" Requires="a14">
+        <mc:AlternateContent xmlns:mc="http://schemas.openxmlformats.org/markup-compatibility/2006" xmlns:a14="http://schemas.microsoft.com/office/drawing/2010/main">
+          <mc:Choice Requires="a14">
             <p:sp>
               <p:nvSpPr>
                 <p:cNvPr id="78" name="Rectangle 77">
@@ -5384,7 +5414,7 @@
               </p:txBody>
             </p:sp>
           </mc:Choice>
-          <mc:Fallback>
+          <mc:Fallback xmlns="">
             <p:sp>
               <p:nvSpPr>
                 <p:cNvPr id="78" name="Rectangle 77">
@@ -5432,8 +5462,8 @@
             </p:sp>
           </mc:Fallback>
         </mc:AlternateContent>
-        <mc:AlternateContent xmlns:mc="http://schemas.openxmlformats.org/markup-compatibility/2006">
-          <mc:Choice xmlns:a14="http://schemas.microsoft.com/office/drawing/2010/main" Requires="a14">
+        <mc:AlternateContent xmlns:mc="http://schemas.openxmlformats.org/markup-compatibility/2006" xmlns:a14="http://schemas.microsoft.com/office/drawing/2010/main">
+          <mc:Choice Requires="a14">
             <p:sp>
               <p:nvSpPr>
                 <p:cNvPr id="79" name="Rectangle 78">
@@ -5506,7 +5536,7 @@
               </p:txBody>
             </p:sp>
           </mc:Choice>
-          <mc:Fallback>
+          <mc:Fallback xmlns="">
             <p:sp>
               <p:nvSpPr>
                 <p:cNvPr id="79" name="Rectangle 78">
@@ -6225,6 +6255,8 @@
               <a:solidFill>
                 <a:schemeClr val="tx1"/>
               </a:solidFill>
+              <a:headEnd type="none" w="med" len="med"/>
+              <a:tailEnd type="arrow" w="med" len="med"/>
             </a:ln>
           </p:spPr>
           <p:style>
@@ -6242,8 +6274,8 @@
             </a:fontRef>
           </p:style>
         </p:cxnSp>
-        <mc:AlternateContent xmlns:mc="http://schemas.openxmlformats.org/markup-compatibility/2006">
-          <mc:Choice xmlns:a14="http://schemas.microsoft.com/office/drawing/2010/main" Requires="a14">
+        <mc:AlternateContent xmlns:mc="http://schemas.openxmlformats.org/markup-compatibility/2006" xmlns:a14="http://schemas.microsoft.com/office/drawing/2010/main">
+          <mc:Choice Requires="a14">
             <p:sp>
               <p:nvSpPr>
                 <p:cNvPr id="96" name="Rectangle 95">
@@ -6297,7 +6329,7 @@
               </p:txBody>
             </p:sp>
           </mc:Choice>
-          <mc:Fallback>
+          <mc:Fallback xmlns="">
             <p:sp>
               <p:nvSpPr>
                 <p:cNvPr id="96" name="Rectangle 95">
@@ -6345,8 +6377,8 @@
             </p:sp>
           </mc:Fallback>
         </mc:AlternateContent>
-        <mc:AlternateContent xmlns:mc="http://schemas.openxmlformats.org/markup-compatibility/2006">
-          <mc:Choice xmlns:a14="http://schemas.microsoft.com/office/drawing/2010/main" Requires="a14">
+        <mc:AlternateContent xmlns:mc="http://schemas.openxmlformats.org/markup-compatibility/2006" xmlns:a14="http://schemas.microsoft.com/office/drawing/2010/main">
+          <mc:Choice Requires="a14">
             <p:sp>
               <p:nvSpPr>
                 <p:cNvPr id="97" name="Rectangle 96">
@@ -6398,7 +6430,7 @@
               </p:txBody>
             </p:sp>
           </mc:Choice>
-          <mc:Fallback>
+          <mc:Fallback xmlns="">
             <p:sp>
               <p:nvSpPr>
                 <p:cNvPr id="97" name="Rectangle 96">

</xml_diff>